<commit_message>
short presentation for microsoft interview
</commit_message>
<xml_diff>
--- a/ms-interview-presentation/git-ms-interview.pptx
+++ b/ms-interview-presentation/git-ms-interview.pptx
@@ -7,23 +7,23 @@
   <p:sldIdLst>
     <p:sldId id="256" r:id="rId2"/>
     <p:sldId id="264" r:id="rId3"/>
-    <p:sldId id="267" r:id="rId4"/>
-    <p:sldId id="266" r:id="rId5"/>
-    <p:sldId id="261" r:id="rId6"/>
-    <p:sldId id="295" r:id="rId7"/>
-    <p:sldId id="263" r:id="rId8"/>
-    <p:sldId id="275" r:id="rId9"/>
-    <p:sldId id="276" r:id="rId10"/>
-    <p:sldId id="259" r:id="rId11"/>
-    <p:sldId id="294" r:id="rId12"/>
-    <p:sldId id="270" r:id="rId13"/>
-    <p:sldId id="277" r:id="rId14"/>
-    <p:sldId id="272" r:id="rId15"/>
-    <p:sldId id="278" r:id="rId16"/>
-    <p:sldId id="279" r:id="rId17"/>
-    <p:sldId id="280" r:id="rId18"/>
-    <p:sldId id="282" r:id="rId19"/>
-    <p:sldId id="284" r:id="rId20"/>
+    <p:sldId id="263" r:id="rId4"/>
+    <p:sldId id="753" r:id="rId5"/>
+    <p:sldId id="275" r:id="rId6"/>
+    <p:sldId id="754" r:id="rId7"/>
+    <p:sldId id="755" r:id="rId8"/>
+    <p:sldId id="276" r:id="rId9"/>
+    <p:sldId id="259" r:id="rId10"/>
+    <p:sldId id="773" r:id="rId11"/>
+    <p:sldId id="270" r:id="rId12"/>
+    <p:sldId id="277" r:id="rId13"/>
+    <p:sldId id="272" r:id="rId14"/>
+    <p:sldId id="278" r:id="rId15"/>
+    <p:sldId id="279" r:id="rId16"/>
+    <p:sldId id="280" r:id="rId17"/>
+    <p:sldId id="282" r:id="rId18"/>
+    <p:sldId id="284" r:id="rId19"/>
+    <p:sldId id="787" r:id="rId20"/>
     <p:sldId id="283" r:id="rId21"/>
     <p:sldId id="285" r:id="rId22"/>
     <p:sldId id="286" r:id="rId23"/>
@@ -31,8 +31,8 @@
     <p:sldId id="307" r:id="rId25"/>
     <p:sldId id="288" r:id="rId26"/>
     <p:sldId id="296" r:id="rId27"/>
-    <p:sldId id="301" r:id="rId28"/>
-    <p:sldId id="302" r:id="rId29"/>
+    <p:sldId id="302" r:id="rId28"/>
+    <p:sldId id="775" r:id="rId29"/>
     <p:sldId id="303" r:id="rId30"/>
     <p:sldId id="304" r:id="rId31"/>
     <p:sldId id="305" r:id="rId32"/>
@@ -46,25 +46,32 @@
     <p:sldId id="319" r:id="rId40"/>
     <p:sldId id="324" r:id="rId41"/>
     <p:sldId id="543" r:id="rId42"/>
-    <p:sldId id="402" r:id="rId43"/>
-    <p:sldId id="354" r:id="rId44"/>
-    <p:sldId id="357" r:id="rId45"/>
-    <p:sldId id="380" r:id="rId46"/>
-    <p:sldId id="562" r:id="rId47"/>
-    <p:sldId id="563" r:id="rId48"/>
-    <p:sldId id="383" r:id="rId49"/>
-    <p:sldId id="619" r:id="rId50"/>
-    <p:sldId id="387" r:id="rId51"/>
-    <p:sldId id="388" r:id="rId52"/>
-    <p:sldId id="345" r:id="rId53"/>
-    <p:sldId id="363" r:id="rId54"/>
-    <p:sldId id="404" r:id="rId55"/>
-    <p:sldId id="327" r:id="rId56"/>
-    <p:sldId id="328" r:id="rId57"/>
-    <p:sldId id="390" r:id="rId58"/>
-    <p:sldId id="748" r:id="rId59"/>
-    <p:sldId id="750" r:id="rId60"/>
-    <p:sldId id="260" r:id="rId61"/>
+    <p:sldId id="786" r:id="rId43"/>
+    <p:sldId id="779" r:id="rId44"/>
+    <p:sldId id="780" r:id="rId45"/>
+    <p:sldId id="781" r:id="rId46"/>
+    <p:sldId id="782" r:id="rId47"/>
+    <p:sldId id="783" r:id="rId48"/>
+    <p:sldId id="388" r:id="rId49"/>
+    <p:sldId id="345" r:id="rId50"/>
+    <p:sldId id="363" r:id="rId51"/>
+    <p:sldId id="327" r:id="rId52"/>
+    <p:sldId id="328" r:id="rId53"/>
+    <p:sldId id="756" r:id="rId54"/>
+    <p:sldId id="757" r:id="rId55"/>
+    <p:sldId id="758" r:id="rId56"/>
+    <p:sldId id="785" r:id="rId57"/>
+    <p:sldId id="784" r:id="rId58"/>
+    <p:sldId id="764" r:id="rId59"/>
+    <p:sldId id="765" r:id="rId60"/>
+    <p:sldId id="766" r:id="rId61"/>
+    <p:sldId id="767" r:id="rId62"/>
+    <p:sldId id="759" r:id="rId63"/>
+    <p:sldId id="768" r:id="rId64"/>
+    <p:sldId id="769" r:id="rId65"/>
+    <p:sldId id="770" r:id="rId66"/>
+    <p:sldId id="771" r:id="rId67"/>
+    <p:sldId id="260" r:id="rId68"/>
   </p:sldIdLst>
   <p:sldSz cx="12192000" cy="6858000"/>
   <p:notesSz cx="6858000" cy="9144000"/>
@@ -6095,7 +6102,7 @@
           <a:p>
             <a:r>
               <a:rPr lang="en-US" dirty="0" smtClean="0"/>
-              <a:t>git</a:t>
+              <a:t>git &amp; version control</a:t>
             </a:r>
             <a:endParaRPr lang="en-US" dirty="0"/>
           </a:p>
@@ -6130,8 +6137,13 @@
             </a:r>
             <a:r>
               <a:rPr lang="en-US" i="1" dirty="0" smtClean="0"/>
-              <a:t>ntroduction &amp; explanation by </a:t>
-            </a:r>
+              <a:t>ntroduction </a:t>
+            </a:r>
+            <a:r>
+              <a:rPr lang="en-US" i="1" dirty="0" smtClean="0"/>
+              <a:t>by </a:t>
+            </a:r>
+            <a:endParaRPr lang="en-US" i="1" dirty="0" smtClean="0"/>
           </a:p>
           <a:p>
             <a:r>
@@ -6271,8 +6283,21 @@
           <a:lstStyle/>
           <a:p>
             <a:r>
-              <a:rPr lang="en-US" dirty="0" smtClean="0"/>
-              <a:t>write the whole thing at once</a:t>
+              <a:rPr lang="en-US" dirty="0"/>
+              <a:t>w</a:t>
+            </a:r>
+            <a:r>
+              <a:rPr lang="en-US" dirty="0" smtClean="0"/>
+              <a:t>rite the whole thing at once</a:t>
+            </a:r>
+          </a:p>
+          <a:p>
+            <a:endParaRPr lang="en-US" dirty="0" smtClean="0"/>
+          </a:p>
+          <a:p>
+            <a:r>
+              <a:rPr lang="en-US" dirty="0" smtClean="0"/>
+              <a:t>I love coding. It's lots of fun!</a:t>
             </a:r>
             <a:endParaRPr lang="en-US" dirty="0"/>
           </a:p>
@@ -6281,7 +6306,7 @@
     </p:spTree>
     <p:extLst>
       <p:ext uri="{BB962C8B-B14F-4D97-AF65-F5344CB8AC3E}">
-        <p14:creationId xmlns:p14="http://schemas.microsoft.com/office/powerpoint/2010/main" val="1980292581"/>
+        <p14:creationId xmlns:p14="http://schemas.microsoft.com/office/powerpoint/2010/main" val="1697508831"/>
       </p:ext>
     </p:extLst>
   </p:cSld>
@@ -6375,16 +6400,10 @@
             </a:r>
           </a:p>
           <a:p>
-            <a:endParaRPr lang="en-US" dirty="0"/>
-          </a:p>
-          <a:p>
-            <a:r>
-              <a:rPr lang="en-US" smtClean="0"/>
-              <a:t>CLG are NALCS champs. TSM is trash.</a:t>
-            </a:r>
-            <a:endParaRPr lang="en-US" dirty="0"/>
-          </a:p>
-          <a:p>
+            <a:r>
+              <a:rPr lang="en-US" dirty="0" smtClean="0"/>
+              <a:t>unlikely</a:t>
+            </a:r>
             <a:endParaRPr lang="en-US" dirty="0"/>
           </a:p>
         </p:txBody>
@@ -6392,7 +6411,7 @@
     </p:spTree>
     <p:extLst>
       <p:ext uri="{BB962C8B-B14F-4D97-AF65-F5344CB8AC3E}">
-        <p14:creationId xmlns:p14="http://schemas.microsoft.com/office/powerpoint/2010/main" val="2304978718"/>
+        <p14:creationId xmlns:p14="http://schemas.microsoft.com/office/powerpoint/2010/main" val="1645331495"/>
       </p:ext>
     </p:extLst>
   </p:cSld>
@@ -6490,6 +6509,12 @@
               <a:rPr lang="en-US" dirty="0" smtClean="0"/>
               <a:t>unlikely</a:t>
             </a:r>
+          </a:p>
+          <a:p>
+            <a:r>
+              <a:rPr lang="en-US" dirty="0" smtClean="0"/>
+              <a:t>write bits and pieces in multiple settings</a:t>
+            </a:r>
             <a:endParaRPr lang="en-US" dirty="0"/>
           </a:p>
         </p:txBody>
@@ -6497,7 +6522,7 @@
     </p:spTree>
     <p:extLst>
       <p:ext uri="{BB962C8B-B14F-4D97-AF65-F5344CB8AC3E}">
-        <p14:creationId xmlns:p14="http://schemas.microsoft.com/office/powerpoint/2010/main" val="1645331495"/>
+        <p14:creationId xmlns:p14="http://schemas.microsoft.com/office/powerpoint/2010/main" val="514095045"/>
       </p:ext>
     </p:extLst>
   </p:cSld>
@@ -6582,25 +6607,21 @@
           <a:lstStyle/>
           <a:p>
             <a:r>
-              <a:rPr lang="en-US" dirty="0"/>
-              <a:t>w</a:t>
-            </a:r>
-            <a:r>
-              <a:rPr lang="en-US" dirty="0" smtClean="0"/>
-              <a:t>rite the whole thing at once</a:t>
-            </a:r>
-          </a:p>
-          <a:p>
-            <a:r>
-              <a:rPr lang="en-US" dirty="0" smtClean="0"/>
-              <a:t>unlikely</a:t>
-            </a:r>
-          </a:p>
-          <a:p>
-            <a:r>
-              <a:rPr lang="en-US" dirty="0" smtClean="0"/>
-              <a:t>write bits and pieces in multiple settings</a:t>
-            </a:r>
+              <a:rPr lang="en-US" dirty="0" smtClean="0"/>
+              <a:t>write</a:t>
+            </a:r>
+          </a:p>
+          <a:p>
+            <a:endParaRPr lang="en-US" dirty="0" smtClean="0"/>
+          </a:p>
+          <a:p>
+            <a:r>
+              <a:rPr lang="en-US" dirty="0" smtClean="0"/>
+              <a:t>I love coding.</a:t>
+            </a:r>
+            <a:endParaRPr lang="en-US" dirty="0"/>
+          </a:p>
+          <a:p>
             <a:endParaRPr lang="en-US" dirty="0"/>
           </a:p>
         </p:txBody>
@@ -6608,7 +6629,7 @@
     </p:spTree>
     <p:extLst>
       <p:ext uri="{BB962C8B-B14F-4D97-AF65-F5344CB8AC3E}">
-        <p14:creationId xmlns:p14="http://schemas.microsoft.com/office/powerpoint/2010/main" val="514095045"/>
+        <p14:creationId xmlns:p14="http://schemas.microsoft.com/office/powerpoint/2010/main" val="2600397186"/>
       </p:ext>
     </p:extLst>
   </p:cSld>
@@ -6694,24 +6715,25 @@
           <a:p>
             <a:r>
               <a:rPr lang="en-US" dirty="0" smtClean="0"/>
-              <a:t>write</a:t>
-            </a:r>
-          </a:p>
-          <a:p>
-            <a:endParaRPr lang="en-US" dirty="0" smtClean="0"/>
-          </a:p>
-          <a:p>
-            <a:r>
-              <a:rPr lang="en-US" dirty="0"/>
-              <a:t>CLG are NALCS champs</a:t>
-            </a:r>
-            <a:r>
-              <a:rPr lang="en-US" dirty="0" smtClean="0"/>
-              <a:t>.</a:t>
-            </a:r>
-            <a:endParaRPr lang="en-US" dirty="0"/>
-          </a:p>
-          <a:p>
+              <a:t>write </a:t>
+            </a:r>
+            <a:r>
+              <a:rPr lang="en-US" dirty="0" smtClean="0">
+                <a:sym typeface="Wingdings" panose="05000000000000000000" pitchFamily="2" charset="2"/>
+              </a:rPr>
+              <a:t> save</a:t>
+            </a:r>
+          </a:p>
+          <a:p>
+            <a:endParaRPr lang="en-US" dirty="0">
+              <a:sym typeface="Wingdings" panose="05000000000000000000" pitchFamily="2" charset="2"/>
+            </a:endParaRPr>
+          </a:p>
+          <a:p>
+            <a:r>
+              <a:rPr lang="en-US" dirty="0" smtClean="0"/>
+              <a:t>I love coding.</a:t>
+            </a:r>
             <a:endParaRPr lang="en-US" dirty="0"/>
           </a:p>
         </p:txBody>
@@ -6719,7 +6741,7 @@
     </p:spTree>
     <p:extLst>
       <p:ext uri="{BB962C8B-B14F-4D97-AF65-F5344CB8AC3E}">
-        <p14:creationId xmlns:p14="http://schemas.microsoft.com/office/powerpoint/2010/main" val="2600397186"/>
+        <p14:creationId xmlns:p14="http://schemas.microsoft.com/office/powerpoint/2010/main" val="2898930479"/>
       </p:ext>
     </p:extLst>
   </p:cSld>
@@ -6798,7 +6820,12 @@
             <p:ph type="body" idx="1"/>
           </p:nvPr>
         </p:nvSpPr>
-        <p:spPr/>
+        <p:spPr>
+          <a:xfrm>
+            <a:off x="1295401" y="3579488"/>
+            <a:ext cx="9590550" cy="1507054"/>
+          </a:xfrm>
+        </p:spPr>
         <p:txBody>
           <a:bodyPr/>
           <a:lstStyle/>
@@ -6811,8 +6838,17 @@
               <a:rPr lang="en-US" dirty="0" smtClean="0">
                 <a:sym typeface="Wingdings" panose="05000000000000000000" pitchFamily="2" charset="2"/>
               </a:rPr>
-              <a:t> save</a:t>
-            </a:r>
+              <a:t> save  </a:t>
+            </a:r>
+            <a:r>
+              <a:rPr lang="en-US" dirty="0" smtClean="0">
+                <a:sym typeface="Wingdings" panose="05000000000000000000" pitchFamily="2" charset="2"/>
+              </a:rPr>
+              <a:t>my-essay.txt</a:t>
+            </a:r>
+            <a:endParaRPr lang="en-US" dirty="0" smtClean="0">
+              <a:sym typeface="Wingdings" panose="05000000000000000000" pitchFamily="2" charset="2"/>
+            </a:endParaRPr>
           </a:p>
           <a:p>
             <a:endParaRPr lang="en-US" dirty="0">
@@ -6821,13 +6857,12 @@
           </a:p>
           <a:p>
             <a:r>
-              <a:rPr lang="en-US" dirty="0"/>
-              <a:t>CLG are NALCS champs</a:t>
-            </a:r>
-            <a:r>
-              <a:rPr lang="en-US" dirty="0" smtClean="0"/>
-              <a:t>.</a:t>
-            </a:r>
+              <a:rPr lang="en-US" dirty="0" smtClean="0"/>
+              <a:t>I love coding.</a:t>
+            </a:r>
+            <a:endParaRPr lang="en-US" dirty="0"/>
+          </a:p>
+          <a:p>
             <a:endParaRPr lang="en-US" dirty="0"/>
           </a:p>
         </p:txBody>
@@ -6835,7 +6870,7 @@
     </p:spTree>
     <p:extLst>
       <p:ext uri="{BB962C8B-B14F-4D97-AF65-F5344CB8AC3E}">
-        <p14:creationId xmlns:p14="http://schemas.microsoft.com/office/powerpoint/2010/main" val="2898930479"/>
+        <p14:creationId xmlns:p14="http://schemas.microsoft.com/office/powerpoint/2010/main" val="3701109282"/>
       </p:ext>
     </p:extLst>
   </p:cSld>
@@ -6921,7 +6956,9 @@
           </a:xfrm>
         </p:spPr>
         <p:txBody>
-          <a:bodyPr/>
+          <a:bodyPr>
+            <a:normAutofit fontScale="92500" lnSpcReduction="20000"/>
+          </a:bodyPr>
           <a:lstStyle/>
           <a:p>
             <a:r>
@@ -6932,7 +6969,30 @@
               <a:rPr lang="en-US" dirty="0" smtClean="0">
                 <a:sym typeface="Wingdings" panose="05000000000000000000" pitchFamily="2" charset="2"/>
               </a:rPr>
-              <a:t> save  s5secretsgg.docx</a:t>
+              <a:t> save  </a:t>
+            </a:r>
+            <a:r>
+              <a:rPr lang="en-US" dirty="0" smtClean="0">
+                <a:sym typeface="Wingdings" panose="05000000000000000000" pitchFamily="2" charset="2"/>
+              </a:rPr>
+              <a:t>my-essay.txt</a:t>
+            </a:r>
+            <a:endParaRPr lang="en-US" dirty="0" smtClean="0">
+              <a:sym typeface="Wingdings" panose="05000000000000000000" pitchFamily="2" charset="2"/>
+            </a:endParaRPr>
+          </a:p>
+          <a:p>
+            <a:r>
+              <a:rPr lang="en-US" dirty="0">
+                <a:sym typeface="Wingdings" panose="05000000000000000000" pitchFamily="2" charset="2"/>
+              </a:rPr>
+              <a:t>p</a:t>
+            </a:r>
+            <a:r>
+              <a:rPr lang="en-US" dirty="0" smtClean="0">
+                <a:sym typeface="Wingdings" panose="05000000000000000000" pitchFamily="2" charset="2"/>
+              </a:rPr>
+              <a:t>rocrastinate</a:t>
             </a:r>
           </a:p>
           <a:p>
@@ -6942,9 +7002,10 @@
           </a:p>
           <a:p>
             <a:r>
-              <a:rPr lang="en-US" dirty="0"/>
-              <a:t>CLG are NALCS champs.</a:t>
-            </a:r>
+              <a:rPr lang="en-US" dirty="0" smtClean="0"/>
+              <a:t>I love coding.</a:t>
+            </a:r>
+            <a:endParaRPr lang="en-US" dirty="0"/>
           </a:p>
           <a:p>
             <a:endParaRPr lang="en-US" dirty="0"/>
@@ -6954,7 +7015,7 @@
     </p:spTree>
     <p:extLst>
       <p:ext uri="{BB962C8B-B14F-4D97-AF65-F5344CB8AC3E}">
-        <p14:creationId xmlns:p14="http://schemas.microsoft.com/office/powerpoint/2010/main" val="3701109282"/>
+        <p14:creationId xmlns:p14="http://schemas.microsoft.com/office/powerpoint/2010/main" val="976301123"/>
       </p:ext>
     </p:extLst>
   </p:cSld>
@@ -7040,9 +7101,7 @@
           </a:xfrm>
         </p:spPr>
         <p:txBody>
-          <a:bodyPr>
-            <a:normAutofit fontScale="92500" lnSpcReduction="20000"/>
-          </a:bodyPr>
+          <a:bodyPr/>
           <a:lstStyle/>
           <a:p>
             <a:r>
@@ -7053,40 +7112,21 @@
               <a:rPr lang="en-US" dirty="0" smtClean="0">
                 <a:sym typeface="Wingdings" panose="05000000000000000000" pitchFamily="2" charset="2"/>
               </a:rPr>
-              <a:t> save  s5secretsgg.docx</a:t>
-            </a:r>
-          </a:p>
-          <a:p>
-            <a:r>
-              <a:rPr lang="en-US" dirty="0">
-                <a:sym typeface="Wingdings" panose="05000000000000000000" pitchFamily="2" charset="2"/>
-              </a:rPr>
-              <a:t>p</a:t>
-            </a:r>
-            <a:r>
-              <a:rPr lang="en-US" dirty="0" smtClean="0">
-                <a:sym typeface="Wingdings" panose="05000000000000000000" pitchFamily="2" charset="2"/>
-              </a:rPr>
-              <a:t>rocrastinate</a:t>
-            </a:r>
-          </a:p>
-          <a:p>
-            <a:endParaRPr lang="en-US" dirty="0">
-              <a:sym typeface="Wingdings" panose="05000000000000000000" pitchFamily="2" charset="2"/>
-            </a:endParaRPr>
-          </a:p>
-          <a:p>
-            <a:r>
-              <a:rPr lang="en-US" dirty="0"/>
-              <a:t>CLG are NALCS champs</a:t>
-            </a:r>
-            <a:r>
-              <a:rPr lang="en-US" dirty="0" smtClean="0"/>
-              <a:t>.</a:t>
-            </a:r>
+              <a:t> save  </a:t>
+            </a:r>
+            <a:r>
+              <a:rPr lang="en-US" dirty="0" smtClean="0"/>
+              <a:t>write</a:t>
+            </a:r>
+          </a:p>
+          <a:p>
             <a:endParaRPr lang="en-US" dirty="0"/>
           </a:p>
           <a:p>
+            <a:r>
+              <a:rPr lang="en-US" dirty="0" smtClean="0"/>
+              <a:t>I love coding. It's lots of fun!</a:t>
+            </a:r>
             <a:endParaRPr lang="en-US" dirty="0"/>
           </a:p>
         </p:txBody>
@@ -7094,7 +7134,7 @@
     </p:spTree>
     <p:extLst>
       <p:ext uri="{BB962C8B-B14F-4D97-AF65-F5344CB8AC3E}">
-        <p14:creationId xmlns:p14="http://schemas.microsoft.com/office/powerpoint/2010/main" val="976301123"/>
+        <p14:creationId xmlns:p14="http://schemas.microsoft.com/office/powerpoint/2010/main" val="1348621172"/>
       </p:ext>
     </p:extLst>
   </p:cSld>
@@ -7195,16 +7235,30 @@
             </a:r>
             <a:r>
               <a:rPr lang="en-US" dirty="0" smtClean="0"/>
-              <a:t>write</a:t>
-            </a:r>
-          </a:p>
-          <a:p>
-            <a:endParaRPr lang="en-US" dirty="0"/>
-          </a:p>
-          <a:p>
-            <a:r>
-              <a:rPr lang="en-US" dirty="0" smtClean="0"/>
-              <a:t>CLG are NALCS champs. TSM is trash.</a:t>
+              <a:t>write </a:t>
+            </a:r>
+            <a:r>
+              <a:rPr lang="en-US" dirty="0">
+                <a:sym typeface="Wingdings" panose="05000000000000000000" pitchFamily="2" charset="2"/>
+              </a:rPr>
+              <a:t> </a:t>
+            </a:r>
+            <a:r>
+              <a:rPr lang="en-US" dirty="0" smtClean="0">
+                <a:sym typeface="Wingdings" panose="05000000000000000000" pitchFamily="2" charset="2"/>
+              </a:rPr>
+              <a:t>save</a:t>
+            </a:r>
+          </a:p>
+          <a:p>
+            <a:endParaRPr lang="en-US" dirty="0">
+              <a:sym typeface="Wingdings" panose="05000000000000000000" pitchFamily="2" charset="2"/>
+            </a:endParaRPr>
+          </a:p>
+          <a:p>
+            <a:r>
+              <a:rPr lang="en-US" dirty="0" smtClean="0"/>
+              <a:t>I love coding. It's lots of fun!</a:t>
             </a:r>
             <a:endParaRPr lang="en-US" dirty="0"/>
           </a:p>
@@ -7213,7 +7267,7 @@
     </p:spTree>
     <p:extLst>
       <p:ext uri="{BB962C8B-B14F-4D97-AF65-F5344CB8AC3E}">
-        <p14:creationId xmlns:p14="http://schemas.microsoft.com/office/powerpoint/2010/main" val="1348621172"/>
+        <p14:creationId xmlns:p14="http://schemas.microsoft.com/office/powerpoint/2010/main" val="2146209999"/>
       </p:ext>
     </p:extLst>
   </p:cSld>
@@ -7320,14 +7374,17 @@
               <a:rPr lang="en-US" dirty="0">
                 <a:sym typeface="Wingdings" panose="05000000000000000000" pitchFamily="2" charset="2"/>
               </a:rPr>
-              <a:t> </a:t>
+              <a:t> save  </a:t>
             </a:r>
             <a:r>
               <a:rPr lang="en-US" dirty="0" smtClean="0">
                 <a:sym typeface="Wingdings" panose="05000000000000000000" pitchFamily="2" charset="2"/>
               </a:rPr>
-              <a:t>save</a:t>
-            </a:r>
+              <a:t>my-essay.txt</a:t>
+            </a:r>
+            <a:endParaRPr lang="en-US" dirty="0" smtClean="0">
+              <a:sym typeface="Wingdings" panose="05000000000000000000" pitchFamily="2" charset="2"/>
+            </a:endParaRPr>
           </a:p>
           <a:p>
             <a:endParaRPr lang="en-US" dirty="0">
@@ -7336,9 +7393,14 @@
           </a:p>
           <a:p>
             <a:r>
-              <a:rPr lang="en-US" smtClean="0"/>
-              <a:t>CLG are NALCS champs. TSM is trash.</a:t>
-            </a:r>
+              <a:rPr lang="en-US" dirty="0" smtClean="0"/>
+              <a:t>I love coding. It's lots of fun!</a:t>
+            </a:r>
+            <a:endParaRPr lang="en-US" dirty="0">
+              <a:sym typeface="Wingdings" panose="05000000000000000000" pitchFamily="2" charset="2"/>
+            </a:endParaRPr>
+          </a:p>
+          <a:p>
             <a:endParaRPr lang="en-US" dirty="0"/>
           </a:p>
         </p:txBody>
@@ -7346,7 +7408,7 @@
     </p:spTree>
     <p:extLst>
       <p:ext uri="{BB962C8B-B14F-4D97-AF65-F5344CB8AC3E}">
-        <p14:creationId xmlns:p14="http://schemas.microsoft.com/office/powerpoint/2010/main" val="2146209999"/>
+        <p14:creationId xmlns:p14="http://schemas.microsoft.com/office/powerpoint/2010/main" val="2722837389"/>
       </p:ext>
     </p:extLst>
   </p:cSld>
@@ -7408,8 +7470,20 @@
           <a:lstStyle/>
           <a:p>
             <a:r>
-              <a:rPr lang="en-US" dirty="0" smtClean="0"/>
-              <a:t>Table of Contents</a:t>
+              <a:rPr lang="en-US" dirty="0"/>
+              <a:t>t</a:t>
+            </a:r>
+            <a:r>
+              <a:rPr lang="en-US" dirty="0" smtClean="0"/>
+              <a:t>able </a:t>
+            </a:r>
+            <a:r>
+              <a:rPr lang="en-US" dirty="0" smtClean="0"/>
+              <a:t>of </a:t>
+            </a:r>
+            <a:r>
+              <a:rPr lang="en-US" dirty="0" smtClean="0"/>
+              <a:t>contents</a:t>
             </a:r>
             <a:endParaRPr lang="en-US" dirty="0"/>
           </a:p>
@@ -7433,42 +7507,37 @@
           <a:lstStyle/>
           <a:p>
             <a:r>
-              <a:rPr lang="en-US" dirty="0" smtClean="0"/>
-              <a:t>What is it?</a:t>
-            </a:r>
-          </a:p>
-          <a:p>
-            <a:pPr lvl="1"/>
-            <a:r>
-              <a:rPr lang="en-US" dirty="0" smtClean="0"/>
-              <a:t>Source control analogy</a:t>
-            </a:r>
-          </a:p>
-          <a:p>
-            <a:endParaRPr lang="en-US" dirty="0" smtClean="0"/>
-          </a:p>
-          <a:p>
-            <a:r>
-              <a:rPr lang="en-US" dirty="0" smtClean="0"/>
-              <a:t>Why use source control?</a:t>
-            </a:r>
-          </a:p>
-          <a:p>
-            <a:pPr lvl="1"/>
-            <a:r>
-              <a:rPr lang="en-US" dirty="0" smtClean="0"/>
-              <a:t>Specifically Git?</a:t>
-            </a:r>
-          </a:p>
-          <a:p>
-            <a:pPr lvl="1"/>
-            <a:r>
-              <a:rPr lang="en-US" dirty="0" smtClean="0"/>
-              <a:t>Terminal vs GUI interface</a:t>
-            </a:r>
-          </a:p>
-          <a:p>
-            <a:endParaRPr lang="en-US" dirty="0"/>
+              <a:rPr lang="en-US" sz="2500" dirty="0"/>
+              <a:t>why use source control</a:t>
+            </a:r>
+            <a:r>
+              <a:rPr lang="en-US" sz="2500" dirty="0" smtClean="0"/>
+              <a:t>?</a:t>
+            </a:r>
+          </a:p>
+          <a:p>
+            <a:endParaRPr lang="en-US" sz="2500" dirty="0" smtClean="0"/>
+          </a:p>
+          <a:p>
+            <a:r>
+              <a:rPr lang="en-US" sz="2500" dirty="0" smtClean="0"/>
+              <a:t>w</a:t>
+            </a:r>
+            <a:r>
+              <a:rPr lang="en-US" sz="2500" dirty="0" smtClean="0"/>
+              <a:t>hat </a:t>
+            </a:r>
+            <a:r>
+              <a:rPr lang="en-US" sz="2500" dirty="0" smtClean="0"/>
+              <a:t>is it</a:t>
+            </a:r>
+            <a:r>
+              <a:rPr lang="en-US" sz="2500" dirty="0" smtClean="0"/>
+              <a:t>?</a:t>
+            </a:r>
+          </a:p>
+          <a:p>
+            <a:endParaRPr lang="en-US" sz="2500" dirty="0" smtClean="0"/>
           </a:p>
         </p:txBody>
       </p:sp>
@@ -7588,18 +7657,27 @@
               <a:rPr lang="en-US" dirty="0" smtClean="0">
                 <a:sym typeface="Wingdings" panose="05000000000000000000" pitchFamily="2" charset="2"/>
               </a:rPr>
-              <a:t>s5secretsgg.docx</a:t>
-            </a:r>
-          </a:p>
-          <a:p>
+              <a:t>my-essay.txt</a:t>
+            </a:r>
+            <a:endParaRPr lang="en-US" dirty="0" smtClean="0">
+              <a:sym typeface="Wingdings" panose="05000000000000000000" pitchFamily="2" charset="2"/>
+            </a:endParaRPr>
+          </a:p>
+          <a:p>
+            <a:r>
+              <a:rPr lang="en-US" dirty="0" smtClean="0">
+                <a:sym typeface="Wingdings" panose="05000000000000000000" pitchFamily="2" charset="2"/>
+              </a:rPr>
+              <a:t>it would be a shame if something bad were to happen…</a:t>
+            </a:r>
             <a:endParaRPr lang="en-US" dirty="0">
               <a:sym typeface="Wingdings" panose="05000000000000000000" pitchFamily="2" charset="2"/>
             </a:endParaRPr>
           </a:p>
           <a:p>
             <a:r>
-              <a:rPr lang="en-US" smtClean="0"/>
-              <a:t>CLG are NALCS champs. TSM is trash.</a:t>
+              <a:rPr lang="en-US" dirty="0" smtClean="0"/>
+              <a:t>I love coding. It's lots of fun!</a:t>
             </a:r>
             <a:endParaRPr lang="en-US" dirty="0">
               <a:sym typeface="Wingdings" panose="05000000000000000000" pitchFamily="2" charset="2"/>
@@ -7726,8 +7804,11 @@
               <a:rPr lang="en-US" dirty="0" smtClean="0">
                 <a:sym typeface="Wingdings" panose="05000000000000000000" pitchFamily="2" charset="2"/>
               </a:rPr>
-              <a:t>s5secretsgg.docx</a:t>
-            </a:r>
+              <a:t>my-essay.txt</a:t>
+            </a:r>
+            <a:endParaRPr lang="en-US" dirty="0" smtClean="0">
+              <a:sym typeface="Wingdings" panose="05000000000000000000" pitchFamily="2" charset="2"/>
+            </a:endParaRPr>
           </a:p>
         </p:txBody>
       </p:sp>
@@ -7890,8 +7971,11 @@
               <a:rPr lang="en-US" dirty="0" smtClean="0">
                 <a:sym typeface="Wingdings" panose="05000000000000000000" pitchFamily="2" charset="2"/>
               </a:rPr>
-              <a:t>s5secretsgg.docx</a:t>
-            </a:r>
+              <a:t>my-essay.txt</a:t>
+            </a:r>
+            <a:endParaRPr lang="en-US" dirty="0" smtClean="0">
+              <a:sym typeface="Wingdings" panose="05000000000000000000" pitchFamily="2" charset="2"/>
+            </a:endParaRPr>
           </a:p>
           <a:p>
             <a:r>
@@ -7904,7 +7988,7 @@
           </a:p>
           <a:p>
             <a:r>
-              <a:rPr lang="en-US" strike="sngStrike" smtClean="0">
+              <a:rPr lang="en-US" strike="sngStrike" dirty="0" smtClean="0">
                 <a:effectLst>
                   <a:outerShdw blurRad="38100" dist="38100" dir="2700000" algn="tl">
                     <a:srgbClr val="000000">
@@ -7913,7 +7997,7 @@
                   </a:outerShdw>
                 </a:effectLst>
               </a:rPr>
-              <a:t>CLG are NALCS champs. TSM is trash.</a:t>
+              <a:t>I love coding. It's lots of fun!</a:t>
             </a:r>
             <a:endParaRPr lang="en-US" strike="sngStrike" dirty="0">
               <a:effectLst>
@@ -8031,16 +8115,17 @@
             </a:r>
             <a:r>
               <a:rPr lang="en-US" dirty="0" smtClean="0"/>
-              <a:t>s5secretsgg.docx</a:t>
-            </a:r>
+              <a:t>my-essay.txt</a:t>
+            </a:r>
+            <a:endParaRPr lang="en-US" dirty="0" smtClean="0"/>
           </a:p>
           <a:p>
             <a:endParaRPr lang="en-US" dirty="0"/>
           </a:p>
           <a:p>
             <a:r>
-              <a:rPr lang="en-US" smtClean="0"/>
-              <a:t>CLG are NALCS champs. TSM is trash.</a:t>
+              <a:rPr lang="en-US" dirty="0" smtClean="0"/>
+              <a:t>I love coding. It's lots of fun!</a:t>
             </a:r>
             <a:endParaRPr lang="en-US" dirty="0"/>
           </a:p>
@@ -8152,8 +8237,9 @@
             </a:r>
             <a:r>
               <a:rPr lang="en-US" dirty="0" smtClean="0"/>
-              <a:t>s5secretsgg.docx</a:t>
-            </a:r>
+              <a:t>my-essay.txt</a:t>
+            </a:r>
+            <a:endParaRPr lang="en-US" dirty="0" smtClean="0"/>
           </a:p>
           <a:p>
             <a:r>
@@ -8164,7 +8250,13 @@
               <a:rPr lang="en-US" dirty="0" smtClean="0">
                 <a:sym typeface="Wingdings" panose="05000000000000000000" pitchFamily="2" charset="2"/>
               </a:rPr>
-              <a:t> s5secretsgg_backup.docx</a:t>
+              <a:t> </a:t>
+            </a:r>
+            <a:r>
+              <a:rPr lang="en-US" dirty="0" smtClean="0">
+                <a:sym typeface="Wingdings" panose="05000000000000000000" pitchFamily="2" charset="2"/>
+              </a:rPr>
+              <a:t>my-essay_backup.txt</a:t>
             </a:r>
             <a:endParaRPr lang="en-US" dirty="0" smtClean="0"/>
           </a:p>
@@ -8173,8 +8265,8 @@
           </a:p>
           <a:p>
             <a:r>
-              <a:rPr lang="en-US" smtClean="0"/>
-              <a:t>CLG are NALCS champs. TSM is trash.</a:t>
+              <a:rPr lang="en-US" dirty="0" smtClean="0"/>
+              <a:t>I love coding. It's lots of fun!</a:t>
             </a:r>
             <a:endParaRPr lang="en-US" dirty="0"/>
           </a:p>
@@ -8286,8 +8378,9 @@
             </a:r>
             <a:r>
               <a:rPr lang="en-US" dirty="0" smtClean="0"/>
-              <a:t>s5secretsgg.docx</a:t>
-            </a:r>
+              <a:t>my-essay.txt</a:t>
+            </a:r>
+            <a:endParaRPr lang="en-US" dirty="0" smtClean="0"/>
           </a:p>
           <a:p>
             <a:r>
@@ -8302,21 +8395,44 @@
               <a:rPr lang="en-US" dirty="0" smtClean="0">
                 <a:sym typeface="Wingdings" panose="05000000000000000000" pitchFamily="2" charset="2"/>
               </a:rPr>
-              <a:t>s5secretsgg.docx											s5secretsgg_backup.docx</a:t>
-            </a:r>
-          </a:p>
-          <a:p>
-            <a:r>
-              <a:rPr lang="en-US" smtClean="0"/>
-              <a:t>CLG are NALCS champs. TSM is trash.</a:t>
+              <a:t>my-essay.txt</a:t>
+            </a:r>
+            <a:r>
+              <a:rPr lang="en-US" dirty="0" smtClean="0">
+                <a:sym typeface="Wingdings" panose="05000000000000000000" pitchFamily="2" charset="2"/>
+              </a:rPr>
+              <a:t>											</a:t>
+            </a:r>
+            <a:r>
+              <a:rPr lang="en-US" dirty="0" smtClean="0">
+                <a:sym typeface="Wingdings" panose="05000000000000000000" pitchFamily="2" charset="2"/>
+              </a:rPr>
+              <a:t>my-essay_backup.txt</a:t>
+            </a:r>
+            <a:endParaRPr lang="en-US" dirty="0" smtClean="0">
+              <a:sym typeface="Wingdings" panose="05000000000000000000" pitchFamily="2" charset="2"/>
+            </a:endParaRPr>
+          </a:p>
+          <a:p>
+            <a:r>
+              <a:rPr lang="en-US" dirty="0" smtClean="0"/>
+              <a:t>I love coding. It's lots of fun!</a:t>
             </a:r>
             <a:r>
               <a:rPr lang="en-US" dirty="0" smtClean="0"/>
               <a:t>		</a:t>
             </a:r>
             <a:r>
-              <a:rPr lang="en-US" smtClean="0"/>
-              <a:t>	CLG are NALCS champs. TSM is trash.</a:t>
+              <a:rPr lang="en-US" dirty="0" smtClean="0"/>
+              <a:t>			</a:t>
+            </a:r>
+            <a:r>
+              <a:rPr lang="en-US" dirty="0" smtClean="0"/>
+              <a:t>	</a:t>
+            </a:r>
+            <a:r>
+              <a:rPr lang="en-US" dirty="0" smtClean="0"/>
+              <a:t>I love coding. It's lots of fun!</a:t>
             </a:r>
             <a:endParaRPr lang="en-US" dirty="0"/>
           </a:p>
@@ -8420,7 +8536,7 @@
               <a:rPr lang="en-US" dirty="0" smtClean="0">
                 <a:sym typeface="Wingdings" panose="05000000000000000000" pitchFamily="2" charset="2"/>
               </a:rPr>
-              <a:t>s5secretsgg.docx</a:t>
+              <a:t>my-essay.txt</a:t>
             </a:r>
             <a:r>
               <a:rPr lang="en-US" dirty="0">
@@ -8432,21 +8548,38 @@
               <a:rPr lang="en-US" dirty="0" smtClean="0">
                 <a:sym typeface="Wingdings" panose="05000000000000000000" pitchFamily="2" charset="2"/>
               </a:rPr>
-              <a:t>								s5secretsgg_backup.docx</a:t>
-            </a:r>
-          </a:p>
-          <a:p>
-            <a:r>
-              <a:rPr lang="en-US" smtClean="0"/>
-              <a:t>CLG are NALCS champs. TSM is trash.</a:t>
+              <a:t>								</a:t>
+            </a:r>
+            <a:r>
+              <a:rPr lang="en-US" dirty="0" smtClean="0">
+                <a:sym typeface="Wingdings" panose="05000000000000000000" pitchFamily="2" charset="2"/>
+              </a:rPr>
+              <a:t>my-essay_backup.txt</a:t>
+            </a:r>
+            <a:endParaRPr lang="en-US" dirty="0" smtClean="0">
+              <a:sym typeface="Wingdings" panose="05000000000000000000" pitchFamily="2" charset="2"/>
+            </a:endParaRPr>
+          </a:p>
+          <a:p>
+            <a:r>
+              <a:rPr lang="en-US" dirty="0" smtClean="0"/>
+              <a:t>I love coding. It's lots of fun!</a:t>
             </a:r>
             <a:r>
               <a:rPr lang="en-US" dirty="0" smtClean="0"/>
               <a:t>		</a:t>
             </a:r>
             <a:r>
-              <a:rPr lang="en-US" smtClean="0"/>
-              <a:t>	CLG are NALCS champs. TSM is trash.</a:t>
+              <a:rPr lang="en-US" dirty="0" smtClean="0"/>
+              <a:t>		</a:t>
+            </a:r>
+            <a:r>
+              <a:rPr lang="en-US" dirty="0" smtClean="0"/>
+              <a:t>	</a:t>
+            </a:r>
+            <a:r>
+              <a:rPr lang="en-US" dirty="0" smtClean="0"/>
+              <a:t>I love coding. It's lots of fun!</a:t>
             </a:r>
             <a:endParaRPr lang="en-US" dirty="0"/>
           </a:p>
@@ -8545,12 +8678,12 @@
         <p:spPr>
           <a:xfrm>
             <a:off x="976745" y="3579488"/>
-            <a:ext cx="10235046" cy="1507054"/>
+            <a:ext cx="10235046" cy="1955464"/>
           </a:xfrm>
         </p:spPr>
         <p:txBody>
           <a:bodyPr>
-            <a:normAutofit fontScale="92500" lnSpcReduction="20000"/>
+            <a:normAutofit/>
           </a:bodyPr>
           <a:lstStyle/>
           <a:p>
@@ -8558,7 +8691,7 @@
               <a:rPr lang="en-US" dirty="0" smtClean="0">
                 <a:sym typeface="Wingdings" panose="05000000000000000000" pitchFamily="2" charset="2"/>
               </a:rPr>
-              <a:t>s5secretsgg.docx</a:t>
+              <a:t>my-essay.txt</a:t>
             </a:r>
             <a:r>
               <a:rPr lang="en-US" dirty="0">
@@ -8570,52 +8703,52 @@
               <a:rPr lang="en-US" dirty="0" smtClean="0">
                 <a:sym typeface="Wingdings" panose="05000000000000000000" pitchFamily="2" charset="2"/>
               </a:rPr>
-              <a:t>								s5secretsgg_backup.docx</a:t>
-            </a:r>
-          </a:p>
-          <a:p>
-            <a:r>
-              <a:rPr lang="en-US" smtClean="0"/>
-              <a:t>CLG are NALCS champs. TSM is trash.</a:t>
-            </a:r>
-            <a:r>
-              <a:rPr lang="en-US" dirty="0" smtClean="0"/>
-              <a:t>		</a:t>
-            </a:r>
-            <a:r>
-              <a:rPr lang="en-US" smtClean="0"/>
-              <a:t>	CLG are NALCS champs. TSM is trash.</a:t>
-            </a:r>
-            <a:endParaRPr lang="en-US" dirty="0" smtClean="0"/>
-          </a:p>
-          <a:p>
-            <a:endParaRPr lang="en-US" dirty="0" smtClean="0"/>
-          </a:p>
-          <a:p>
-            <a:r>
-              <a:rPr lang="en-US" dirty="0"/>
-              <a:t>w</a:t>
-            </a:r>
-            <a:r>
-              <a:rPr lang="en-US" dirty="0" smtClean="0"/>
-              <a:t>hat if we mess up our active copy</a:t>
-            </a:r>
-            <a:endParaRPr lang="en-US" dirty="0"/>
-          </a:p>
-          <a:p>
-            <a:endParaRPr lang="en-US" dirty="0"/>
-          </a:p>
-          <a:p>
+              <a:t>								</a:t>
+            </a:r>
+            <a:r>
+              <a:rPr lang="en-US" dirty="0" smtClean="0">
+                <a:sym typeface="Wingdings" panose="05000000000000000000" pitchFamily="2" charset="2"/>
+              </a:rPr>
+              <a:t>my-essay_backup.txt</a:t>
+            </a:r>
             <a:endParaRPr lang="en-US" dirty="0" smtClean="0">
               <a:sym typeface="Wingdings" panose="05000000000000000000" pitchFamily="2" charset="2"/>
             </a:endParaRPr>
           </a:p>
+          <a:p>
+            <a:r>
+              <a:rPr lang="en-US" dirty="0"/>
+              <a:t>I love coding. It's lots of fun!					I love coding. It's lots of fun!</a:t>
+            </a:r>
+          </a:p>
+          <a:p>
+            <a:endParaRPr lang="en-US" dirty="0" smtClean="0"/>
+          </a:p>
+          <a:p>
+            <a:r>
+              <a:rPr lang="en-US" dirty="0"/>
+              <a:t>w</a:t>
+            </a:r>
+            <a:r>
+              <a:rPr lang="en-US" dirty="0" smtClean="0"/>
+              <a:t>hat if we mess up our active copy</a:t>
+            </a:r>
+            <a:endParaRPr lang="en-US" dirty="0"/>
+          </a:p>
+          <a:p>
+            <a:endParaRPr lang="en-US" dirty="0"/>
+          </a:p>
+          <a:p>
+            <a:endParaRPr lang="en-US" dirty="0" smtClean="0">
+              <a:sym typeface="Wingdings" panose="05000000000000000000" pitchFamily="2" charset="2"/>
+            </a:endParaRPr>
+          </a:p>
         </p:txBody>
       </p:sp>
     </p:spTree>
     <p:extLst>
       <p:ext uri="{BB962C8B-B14F-4D97-AF65-F5344CB8AC3E}">
-        <p14:creationId xmlns:p14="http://schemas.microsoft.com/office/powerpoint/2010/main" val="1299992228"/>
+        <p14:creationId xmlns:p14="http://schemas.microsoft.com/office/powerpoint/2010/main" val="499232950"/>
       </p:ext>
     </p:extLst>
   </p:cSld>
@@ -8697,12 +8830,12 @@
         <p:spPr>
           <a:xfrm>
             <a:off x="976745" y="3579488"/>
-            <a:ext cx="10235046" cy="1507054"/>
+            <a:ext cx="10235046" cy="1955464"/>
           </a:xfrm>
         </p:spPr>
         <p:txBody>
           <a:bodyPr>
-            <a:normAutofit fontScale="92500" lnSpcReduction="20000"/>
+            <a:normAutofit/>
           </a:bodyPr>
           <a:lstStyle/>
           <a:p>
@@ -8710,7 +8843,7 @@
               <a:rPr lang="en-US" dirty="0" smtClean="0">
                 <a:sym typeface="Wingdings" panose="05000000000000000000" pitchFamily="2" charset="2"/>
               </a:rPr>
-              <a:t>s5secretsgg.docx</a:t>
+              <a:t>my-essay.txt</a:t>
             </a:r>
             <a:r>
               <a:rPr lang="en-US" dirty="0">
@@ -8722,48 +8855,61 @@
               <a:rPr lang="en-US" dirty="0" smtClean="0">
                 <a:sym typeface="Wingdings" panose="05000000000000000000" pitchFamily="2" charset="2"/>
               </a:rPr>
-              <a:t>								s5secretsgg_backup.docx</a:t>
-            </a:r>
-          </a:p>
-          <a:p>
-            <a:r>
-              <a:rPr lang="en-US" dirty="0" smtClean="0"/>
-              <a:t>TSM are NALCS champs. No thread is safe.		</a:t>
-            </a:r>
-            <a:r>
-              <a:rPr lang="en-US" smtClean="0"/>
-              <a:t>	CLG are NALCS champs. TSM is trash.</a:t>
-            </a:r>
-            <a:endParaRPr lang="en-US" dirty="0" smtClean="0"/>
-          </a:p>
-          <a:p>
-            <a:endParaRPr lang="en-US" dirty="0" smtClean="0"/>
-          </a:p>
-          <a:p>
-            <a:r>
-              <a:rPr lang="en-US" dirty="0"/>
-              <a:t>w</a:t>
-            </a:r>
-            <a:r>
-              <a:rPr lang="en-US" dirty="0" smtClean="0"/>
-              <a:t>hat if we mess up our active copy</a:t>
-            </a:r>
-            <a:endParaRPr lang="en-US" dirty="0"/>
-          </a:p>
-          <a:p>
-            <a:endParaRPr lang="en-US" dirty="0"/>
-          </a:p>
-          <a:p>
+              <a:t>								</a:t>
+            </a:r>
+            <a:r>
+              <a:rPr lang="en-US" dirty="0" smtClean="0">
+                <a:sym typeface="Wingdings" panose="05000000000000000000" pitchFamily="2" charset="2"/>
+              </a:rPr>
+              <a:t>my-essay_backup.txt</a:t>
+            </a:r>
             <a:endParaRPr lang="en-US" dirty="0" smtClean="0">
               <a:sym typeface="Wingdings" panose="05000000000000000000" pitchFamily="2" charset="2"/>
             </a:endParaRPr>
           </a:p>
+          <a:p>
+            <a:r>
+              <a:rPr lang="en-US" dirty="0" smtClean="0"/>
+              <a:t>I hate coding. It's hard and boring!		</a:t>
+            </a:r>
+            <a:r>
+              <a:rPr lang="en-US" dirty="0" smtClean="0"/>
+              <a:t>			</a:t>
+            </a:r>
+            <a:r>
+              <a:rPr lang="en-US" dirty="0" smtClean="0"/>
+              <a:t>I love coding. It's lots of fun!</a:t>
+            </a:r>
+            <a:endParaRPr lang="en-US" dirty="0" smtClean="0"/>
+          </a:p>
+          <a:p>
+            <a:endParaRPr lang="en-US" dirty="0" smtClean="0"/>
+          </a:p>
+          <a:p>
+            <a:r>
+              <a:rPr lang="en-US" dirty="0"/>
+              <a:t>w</a:t>
+            </a:r>
+            <a:r>
+              <a:rPr lang="en-US" dirty="0" smtClean="0"/>
+              <a:t>hat if we mess up our active copy</a:t>
+            </a:r>
+            <a:endParaRPr lang="en-US" dirty="0"/>
+          </a:p>
+          <a:p>
+            <a:endParaRPr lang="en-US" dirty="0"/>
+          </a:p>
+          <a:p>
+            <a:endParaRPr lang="en-US" dirty="0" smtClean="0">
+              <a:sym typeface="Wingdings" panose="05000000000000000000" pitchFamily="2" charset="2"/>
+            </a:endParaRPr>
+          </a:p>
         </p:txBody>
       </p:sp>
     </p:spTree>
     <p:extLst>
       <p:ext uri="{BB962C8B-B14F-4D97-AF65-F5344CB8AC3E}">
-        <p14:creationId xmlns:p14="http://schemas.microsoft.com/office/powerpoint/2010/main" val="499232950"/>
+        <p14:creationId xmlns:p14="http://schemas.microsoft.com/office/powerpoint/2010/main" val="2211417243"/>
       </p:ext>
     </p:extLst>
   </p:cSld>
@@ -8850,7 +8996,7 @@
         </p:spPr>
         <p:txBody>
           <a:bodyPr>
-            <a:normAutofit fontScale="92500"/>
+            <a:normAutofit/>
           </a:bodyPr>
           <a:lstStyle/>
           <a:p>
@@ -8858,7 +9004,7 @@
               <a:rPr lang="en-US" dirty="0" smtClean="0">
                 <a:sym typeface="Wingdings" panose="05000000000000000000" pitchFamily="2" charset="2"/>
               </a:rPr>
-              <a:t>s5secretsgg.docx</a:t>
+              <a:t>my-essay.txt</a:t>
             </a:r>
             <a:r>
               <a:rPr lang="en-US" dirty="0">
@@ -8870,19 +9016,23 @@
               <a:rPr lang="en-US" dirty="0" smtClean="0">
                 <a:sym typeface="Wingdings" panose="05000000000000000000" pitchFamily="2" charset="2"/>
               </a:rPr>
-              <a:t>								s5secretsgg_backup.docx</a:t>
-            </a:r>
-          </a:p>
-          <a:p>
-            <a:r>
-              <a:rPr lang="en-US" dirty="0" smtClean="0"/>
-              <a:t>TSM are NALCS champs. No thread is safe.		</a:t>
-            </a:r>
-            <a:r>
-              <a:rPr lang="en-US" smtClean="0"/>
-              <a:t>	CLG are NALCS champs. TSM is trash.</a:t>
-            </a:r>
-            <a:endParaRPr lang="en-US" dirty="0" smtClean="0"/>
+              <a:t>								</a:t>
+            </a:r>
+            <a:r>
+              <a:rPr lang="en-US" dirty="0" smtClean="0">
+                <a:sym typeface="Wingdings" panose="05000000000000000000" pitchFamily="2" charset="2"/>
+              </a:rPr>
+              <a:t>my-essay_backup.txt</a:t>
+            </a:r>
+            <a:endParaRPr lang="en-US" dirty="0" smtClean="0">
+              <a:sym typeface="Wingdings" panose="05000000000000000000" pitchFamily="2" charset="2"/>
+            </a:endParaRPr>
+          </a:p>
+          <a:p>
+            <a:r>
+              <a:rPr lang="en-US" dirty="0"/>
+              <a:t>I hate coding. It's hard and boring!					I love coding. It's lots of fun!</a:t>
+            </a:r>
           </a:p>
           <a:p>
             <a:endParaRPr lang="en-US" dirty="0" smtClean="0"/>
@@ -8980,7 +9130,7 @@
             </a:r>
             <a:r>
               <a:rPr lang="en-US" dirty="0" smtClean="0"/>
-              <a:t>hat is a git</a:t>
+              <a:t>hy use version control</a:t>
             </a:r>
             <a:endParaRPr lang="en-US" dirty="0"/>
           </a:p>
@@ -8988,7 +9138,7 @@
       </p:sp>
       <p:sp>
         <p:nvSpPr>
-          <p:cNvPr id="5" name="Text Placeholder 4"/>
+          <p:cNvPr id="4" name="Content Placeholder 3"/>
           <p:cNvSpPr>
             <a:spLocks noGrp="1"/>
           </p:cNvSpPr>
@@ -9001,25 +9151,14 @@
           <a:bodyPr/>
           <a:lstStyle/>
           <a:p>
-            <a:r>
-              <a:rPr lang="en-US" dirty="0"/>
-              <a:t>g</a:t>
-            </a:r>
-            <a:r>
-              <a:rPr lang="en-US" dirty="0" smtClean="0"/>
-              <a:t>it: [informal] </a:t>
-            </a:r>
-            <a:r>
-              <a:rPr lang="en-US" dirty="0"/>
-              <a:t>[British] an unpleasant or contemptible person.</a:t>
-            </a:r>
+            <a:endParaRPr lang="en-US" dirty="0"/>
           </a:p>
         </p:txBody>
       </p:sp>
     </p:spTree>
     <p:extLst>
       <p:ext uri="{BB962C8B-B14F-4D97-AF65-F5344CB8AC3E}">
-        <p14:creationId xmlns:p14="http://schemas.microsoft.com/office/powerpoint/2010/main" val="1985933698"/>
+        <p14:creationId xmlns:p14="http://schemas.microsoft.com/office/powerpoint/2010/main" val="3229551672"/>
       </p:ext>
     </p:extLst>
   </p:cSld>
@@ -9106,7 +9245,7 @@
         </p:spPr>
         <p:txBody>
           <a:bodyPr>
-            <a:normAutofit fontScale="92500"/>
+            <a:normAutofit/>
           </a:bodyPr>
           <a:lstStyle/>
           <a:p>
@@ -9114,7 +9253,7 @@
               <a:rPr lang="en-US" dirty="0" smtClean="0">
                 <a:sym typeface="Wingdings" panose="05000000000000000000" pitchFamily="2" charset="2"/>
               </a:rPr>
-              <a:t>s5secretsgg.docx</a:t>
+              <a:t>my-essay.txt</a:t>
             </a:r>
             <a:r>
               <a:rPr lang="en-US" dirty="0">
@@ -9126,21 +9265,38 @@
               <a:rPr lang="en-US" dirty="0" smtClean="0">
                 <a:sym typeface="Wingdings" panose="05000000000000000000" pitchFamily="2" charset="2"/>
               </a:rPr>
-              <a:t>								s5secretsgg_backup.docx</a:t>
-            </a:r>
+              <a:t>								</a:t>
+            </a:r>
+            <a:r>
+              <a:rPr lang="en-US" dirty="0" smtClean="0">
+                <a:sym typeface="Wingdings" panose="05000000000000000000" pitchFamily="2" charset="2"/>
+              </a:rPr>
+              <a:t>my-essay_backup.txt</a:t>
+            </a:r>
+            <a:endParaRPr lang="en-US" dirty="0" smtClean="0">
+              <a:sym typeface="Wingdings" panose="05000000000000000000" pitchFamily="2" charset="2"/>
+            </a:endParaRPr>
           </a:p>
           <a:p>
             <a:r>
               <a:rPr lang="en-US" strike="sngStrike" dirty="0" smtClean="0"/>
-              <a:t>TSM are NALCS champs. No thread is safe.</a:t>
+              <a:t>I hate coding. It’s hard and boring!</a:t>
             </a:r>
             <a:r>
               <a:rPr lang="en-US" dirty="0" smtClean="0"/>
               <a:t>		</a:t>
             </a:r>
             <a:r>
-              <a:rPr lang="en-US" smtClean="0"/>
-              <a:t>	CLG are NALCS champs. TSM is trash.</a:t>
+              <a:rPr lang="en-US" dirty="0" smtClean="0"/>
+              <a:t>		</a:t>
+            </a:r>
+            <a:r>
+              <a:rPr lang="en-US" dirty="0" smtClean="0"/>
+              <a:t>	</a:t>
+            </a:r>
+            <a:r>
+              <a:rPr lang="en-US" dirty="0" smtClean="0"/>
+              <a:t>I love coding. It's lots of fun!</a:t>
             </a:r>
             <a:endParaRPr lang="en-US" dirty="0" smtClean="0"/>
           </a:p>
@@ -9264,7 +9420,7 @@
               <a:rPr lang="en-US" dirty="0" smtClean="0">
                 <a:sym typeface="Wingdings" panose="05000000000000000000" pitchFamily="2" charset="2"/>
               </a:rPr>
-              <a:t>s5secretsgg.docx</a:t>
+              <a:t>my-essay.txt</a:t>
             </a:r>
             <a:r>
               <a:rPr lang="en-US" dirty="0">
@@ -9276,21 +9432,38 @@
               <a:rPr lang="en-US" dirty="0" smtClean="0">
                 <a:sym typeface="Wingdings" panose="05000000000000000000" pitchFamily="2" charset="2"/>
               </a:rPr>
-              <a:t>								s5secretsgg_backup.docx</a:t>
-            </a:r>
-          </a:p>
-          <a:p>
-            <a:r>
-              <a:rPr lang="en-US" smtClean="0"/>
-              <a:t>CLG are NALCS champs. TSM is trash.</a:t>
+              <a:t>								</a:t>
+            </a:r>
+            <a:r>
+              <a:rPr lang="en-US" dirty="0" smtClean="0">
+                <a:sym typeface="Wingdings" panose="05000000000000000000" pitchFamily="2" charset="2"/>
+              </a:rPr>
+              <a:t>my-essay_backup.txt</a:t>
+            </a:r>
+            <a:endParaRPr lang="en-US" dirty="0" smtClean="0">
+              <a:sym typeface="Wingdings" panose="05000000000000000000" pitchFamily="2" charset="2"/>
+            </a:endParaRPr>
+          </a:p>
+          <a:p>
+            <a:r>
+              <a:rPr lang="en-US" dirty="0" smtClean="0"/>
+              <a:t>I love coding. It's lots of fun!</a:t>
+            </a:r>
+            <a:r>
+              <a:rPr lang="en-US" dirty="0" smtClean="0"/>
+              <a:t>	</a:t>
             </a:r>
             <a:r>
               <a:rPr lang="en-US" dirty="0" smtClean="0"/>
               <a:t>		</a:t>
             </a:r>
             <a:r>
-              <a:rPr lang="en-US" smtClean="0"/>
-              <a:t>	CLG are NALCS champs. TSM is trash.</a:t>
+              <a:rPr lang="en-US" dirty="0" smtClean="0"/>
+              <a:t>		</a:t>
+            </a:r>
+            <a:r>
+              <a:rPr lang="en-US" dirty="0" smtClean="0"/>
+              <a:t>I love coding. It's lots of fun!</a:t>
             </a:r>
             <a:endParaRPr lang="en-US" dirty="0" smtClean="0"/>
           </a:p>
@@ -9419,7 +9592,7 @@
               <a:rPr lang="en-US" dirty="0" smtClean="0">
                 <a:sym typeface="Wingdings" panose="05000000000000000000" pitchFamily="2" charset="2"/>
               </a:rPr>
-              <a:t>s5secretsgg.docx</a:t>
+              <a:t>my-essay.txt</a:t>
             </a:r>
             <a:r>
               <a:rPr lang="en-US" dirty="0">
@@ -9431,21 +9604,38 @@
               <a:rPr lang="en-US" dirty="0" smtClean="0">
                 <a:sym typeface="Wingdings" panose="05000000000000000000" pitchFamily="2" charset="2"/>
               </a:rPr>
-              <a:t>								s5secretsgg_backup.docx</a:t>
-            </a:r>
-          </a:p>
-          <a:p>
-            <a:r>
-              <a:rPr lang="en-US" smtClean="0"/>
-              <a:t>CLG are NALCS champs. TSM is trash.</a:t>
+              <a:t>								</a:t>
+            </a:r>
+            <a:r>
+              <a:rPr lang="en-US" dirty="0" smtClean="0">
+                <a:sym typeface="Wingdings" panose="05000000000000000000" pitchFamily="2" charset="2"/>
+              </a:rPr>
+              <a:t>my-essay_backup.txt</a:t>
+            </a:r>
+            <a:endParaRPr lang="en-US" dirty="0" smtClean="0">
+              <a:sym typeface="Wingdings" panose="05000000000000000000" pitchFamily="2" charset="2"/>
+            </a:endParaRPr>
+          </a:p>
+          <a:p>
+            <a:r>
+              <a:rPr lang="en-US" dirty="0" smtClean="0"/>
+              <a:t>I love coding. It's lots of fun!</a:t>
             </a:r>
             <a:r>
               <a:rPr lang="en-US" dirty="0" smtClean="0"/>
               <a:t>		</a:t>
             </a:r>
             <a:r>
-              <a:rPr lang="en-US" smtClean="0"/>
-              <a:t>	CLG are NALCS champs. TSM is trash.</a:t>
+              <a:rPr lang="en-US" dirty="0" smtClean="0"/>
+              <a:t>		</a:t>
+            </a:r>
+            <a:r>
+              <a:rPr lang="en-US" dirty="0" smtClean="0"/>
+              <a:t>	</a:t>
+            </a:r>
+            <a:r>
+              <a:rPr lang="en-US" dirty="0" smtClean="0"/>
+              <a:t>I love coding. It's lots of fun!</a:t>
             </a:r>
             <a:endParaRPr lang="en-US" dirty="0" smtClean="0"/>
           </a:p>
@@ -9601,8 +9791,23 @@
               <a:rPr lang="en-US" dirty="0" smtClean="0">
                 <a:sym typeface="Wingdings" panose="05000000000000000000" pitchFamily="2" charset="2"/>
               </a:rPr>
-              <a:t>s5secretsgg.docx									s5secretsgg_backup.docx</a:t>
-            </a:r>
+              <a:t>my-essay.txt</a:t>
+            </a:r>
+            <a:r>
+              <a:rPr lang="en-US" dirty="0" smtClean="0">
+                <a:sym typeface="Wingdings" panose="05000000000000000000" pitchFamily="2" charset="2"/>
+              </a:rPr>
+              <a:t>									</a:t>
+            </a:r>
+            <a:r>
+              <a:rPr lang="en-US" dirty="0" smtClean="0">
+                <a:sym typeface="Wingdings" panose="05000000000000000000" pitchFamily="2" charset="2"/>
+              </a:rPr>
+              <a:t>my-essay_backup.txt</a:t>
+            </a:r>
+            <a:endParaRPr lang="en-US" dirty="0" smtClean="0">
+              <a:sym typeface="Wingdings" panose="05000000000000000000" pitchFamily="2" charset="2"/>
+            </a:endParaRPr>
           </a:p>
           <a:p>
             <a:r>
@@ -9710,7 +9915,7 @@
         </p:spPr>
         <p:txBody>
           <a:bodyPr>
-            <a:normAutofit fontScale="85000" lnSpcReduction="10000"/>
+            <a:normAutofit/>
           </a:bodyPr>
           <a:lstStyle/>
           <a:p>
@@ -9718,7 +9923,7 @@
               <a:rPr lang="en-US" dirty="0" smtClean="0">
                 <a:sym typeface="Wingdings" panose="05000000000000000000" pitchFamily="2" charset="2"/>
               </a:rPr>
-              <a:t>s5secretsgg.docx</a:t>
+              <a:t>my-essay.txt</a:t>
             </a:r>
             <a:r>
               <a:rPr lang="en-US" dirty="0">
@@ -9730,19 +9935,26 @@
               <a:rPr lang="en-US" dirty="0" smtClean="0">
                 <a:sym typeface="Wingdings" panose="05000000000000000000" pitchFamily="2" charset="2"/>
               </a:rPr>
-              <a:t>				      save 				s5secretsgg_backup.docx</a:t>
-            </a:r>
-          </a:p>
-          <a:p>
-            <a:r>
-              <a:rPr lang="en-US" dirty="0" smtClean="0"/>
-              <a:t>TSM are NALCS champs. No thread is safe.		</a:t>
+              <a:t>				      save 				</a:t>
             </a:r>
             <a:r>
               <a:rPr lang="en-US" dirty="0" smtClean="0">
                 <a:sym typeface="Wingdings" panose="05000000000000000000" pitchFamily="2" charset="2"/>
               </a:rPr>
-              <a:t></a:t>
+              <a:t>my-essay_backup.txt</a:t>
+            </a:r>
+            <a:endParaRPr lang="en-US" dirty="0">
+              <a:sym typeface="Wingdings" panose="05000000000000000000" pitchFamily="2" charset="2"/>
+            </a:endParaRPr>
+          </a:p>
+          <a:p>
+            <a:r>
+              <a:rPr lang="en-US" dirty="0" smtClean="0"/>
+              <a:t>I </a:t>
+            </a:r>
+            <a:r>
+              <a:rPr lang="en-US" dirty="0"/>
+              <a:t>hate coding. It's hard and boring! </a:t>
             </a:r>
             <a:r>
               <a:rPr lang="en-US" dirty="0" smtClean="0"/>
@@ -9750,11 +9962,30 @@
             </a:r>
             <a:r>
               <a:rPr lang="en-US" dirty="0"/>
-              <a:t> TSM are NALCS champs. No thread is safe.</a:t>
-            </a:r>
-            <a:endParaRPr lang="en-US" dirty="0" smtClean="0"/>
-          </a:p>
-          <a:p>
+              <a:t> </a:t>
+            </a:r>
+            <a:r>
+              <a:rPr lang="en-US" dirty="0" smtClean="0"/>
+              <a:t> </a:t>
+            </a:r>
+            <a:r>
+              <a:rPr lang="en-US" dirty="0" smtClean="0">
+                <a:sym typeface="Wingdings" panose="05000000000000000000" pitchFamily="2" charset="2"/>
+              </a:rPr>
+              <a:t>		</a:t>
+            </a:r>
+            <a:r>
+              <a:rPr lang="en-US" dirty="0" smtClean="0"/>
+              <a:t>	</a:t>
+            </a:r>
+            <a:r>
+              <a:rPr lang="en-US" dirty="0"/>
+              <a:t> </a:t>
+            </a:r>
+            <a:r>
+              <a:rPr lang="en-US" dirty="0"/>
+              <a:t>I hate coding. It's hard and boring!</a:t>
+            </a:r>
             <a:endParaRPr lang="en-US" dirty="0" smtClean="0"/>
           </a:p>
           <a:p>
@@ -9871,8 +10102,23 @@
               <a:rPr lang="en-US" dirty="0" smtClean="0">
                 <a:sym typeface="Wingdings" panose="05000000000000000000" pitchFamily="2" charset="2"/>
               </a:rPr>
-              <a:t>s5secretsgg.docx		s5secretsgg_backup.docx</a:t>
-            </a:r>
+              <a:t>my-essay.txt</a:t>
+            </a:r>
+            <a:r>
+              <a:rPr lang="en-US" dirty="0" smtClean="0">
+                <a:sym typeface="Wingdings" panose="05000000000000000000" pitchFamily="2" charset="2"/>
+              </a:rPr>
+              <a:t>		</a:t>
+            </a:r>
+            <a:r>
+              <a:rPr lang="en-US" dirty="0" smtClean="0">
+                <a:sym typeface="Wingdings" panose="05000000000000000000" pitchFamily="2" charset="2"/>
+              </a:rPr>
+              <a:t>my-essay_backup.txt</a:t>
+            </a:r>
+            <a:endParaRPr lang="en-US" dirty="0">
+              <a:sym typeface="Wingdings" panose="05000000000000000000" pitchFamily="2" charset="2"/>
+            </a:endParaRPr>
           </a:p>
           <a:p>
             <a:r>
@@ -9881,6 +10127,9 @@
               </a:rPr>
               <a:t>uh-oh</a:t>
             </a:r>
+            <a:endParaRPr lang="en-US" dirty="0" smtClean="0">
+              <a:sym typeface="Wingdings" panose="05000000000000000000" pitchFamily="2" charset="2"/>
+            </a:endParaRPr>
           </a:p>
         </p:txBody>
       </p:sp>
@@ -9982,8 +10231,23 @@
               <a:rPr lang="en-US" dirty="0" smtClean="0">
                 <a:sym typeface="Wingdings" panose="05000000000000000000" pitchFamily="2" charset="2"/>
               </a:rPr>
-              <a:t>s5secretsgg.docx		s5secretsgg_backup.docx</a:t>
-            </a:r>
+              <a:t>my-essay.txt</a:t>
+            </a:r>
+            <a:r>
+              <a:rPr lang="en-US" dirty="0" smtClean="0">
+                <a:sym typeface="Wingdings" panose="05000000000000000000" pitchFamily="2" charset="2"/>
+              </a:rPr>
+              <a:t>		</a:t>
+            </a:r>
+            <a:r>
+              <a:rPr lang="en-US" dirty="0" smtClean="0">
+                <a:sym typeface="Wingdings" panose="05000000000000000000" pitchFamily="2" charset="2"/>
+              </a:rPr>
+              <a:t>my-essay_backup.txt</a:t>
+            </a:r>
+            <a:endParaRPr lang="en-US" dirty="0" smtClean="0">
+              <a:sym typeface="Wingdings" panose="05000000000000000000" pitchFamily="2" charset="2"/>
+            </a:endParaRPr>
           </a:p>
           <a:p>
             <a:r>
@@ -9998,8 +10262,17 @@
               <a:rPr lang="en-US" dirty="0" smtClean="0">
                 <a:sym typeface="Wingdings" panose="05000000000000000000" pitchFamily="2" charset="2"/>
               </a:rPr>
-              <a:t>we overwrote our backup with the mess up</a:t>
-            </a:r>
+              <a:t>we overwrote our backup with </a:t>
+            </a:r>
+            <a:r>
+              <a:rPr lang="en-US" dirty="0" smtClean="0">
+                <a:sym typeface="Wingdings" panose="05000000000000000000" pitchFamily="2" charset="2"/>
+              </a:rPr>
+              <a:t>a bad copy</a:t>
+            </a:r>
+            <a:endParaRPr lang="en-US" dirty="0" smtClean="0">
+              <a:sym typeface="Wingdings" panose="05000000000000000000" pitchFamily="2" charset="2"/>
+            </a:endParaRPr>
           </a:p>
         </p:txBody>
       </p:sp>
@@ -10107,16 +10380,17 @@
             </a:r>
             <a:r>
               <a:rPr lang="en-US" dirty="0" smtClean="0"/>
-              <a:t>s5secretsgg.docx</a:t>
-            </a:r>
+              <a:t>my-essay.txt</a:t>
+            </a:r>
+            <a:endParaRPr lang="en-US" dirty="0" smtClean="0"/>
           </a:p>
           <a:p>
             <a:endParaRPr lang="en-US" dirty="0"/>
           </a:p>
           <a:p>
             <a:r>
-              <a:rPr lang="en-US" smtClean="0"/>
-              <a:t>CLG are NALCS champs. TSM is trash.</a:t>
+              <a:rPr lang="en-US" dirty="0" smtClean="0"/>
+              <a:t>I love coding. It's lots of fun!</a:t>
             </a:r>
             <a:endParaRPr lang="en-US" dirty="0"/>
           </a:p>
@@ -10228,8 +10502,9 @@
             </a:r>
             <a:r>
               <a:rPr lang="en-US" dirty="0" smtClean="0"/>
-              <a:t>s5secretsgg.docx</a:t>
-            </a:r>
+              <a:t>my-essay.txt</a:t>
+            </a:r>
+            <a:endParaRPr lang="en-US" dirty="0" smtClean="0"/>
           </a:p>
           <a:p>
             <a:r>
@@ -10242,8 +10517,8 @@
           </a:p>
           <a:p>
             <a:r>
-              <a:rPr lang="en-US" smtClean="0"/>
-              <a:t>CLG are NALCS champs. TSM is trash.</a:t>
+              <a:rPr lang="en-US" dirty="0" smtClean="0"/>
+              <a:t>I love coding. It's lots of fun!</a:t>
             </a:r>
             <a:endParaRPr lang="en-US" dirty="0"/>
           </a:p>
@@ -10344,18 +10619,35 @@
           <a:lstStyle/>
           <a:p>
             <a:r>
-              <a:rPr lang="en-US" dirty="0"/>
-              <a:t>s</a:t>
-            </a:r>
-            <a:r>
-              <a:rPr lang="en-US" dirty="0" smtClean="0"/>
-              <a:t>5secretsgg		s5secretsgg_2015-09-01 		s5secretsgg_2015-09-10</a:t>
-            </a:r>
-          </a:p>
-          <a:p>
-            <a:r>
-              <a:rPr lang="en-US" dirty="0" smtClean="0"/>
-              <a:t>s5secretsgg_2015-09-19	</a:t>
+              <a:rPr lang="en-US" dirty="0" smtClean="0"/>
+              <a:t>my-essay</a:t>
+            </a:r>
+            <a:r>
+              <a:rPr lang="en-US" dirty="0" smtClean="0"/>
+              <a:t>		</a:t>
+            </a:r>
+            <a:r>
+              <a:rPr lang="en-US" dirty="0" smtClean="0"/>
+              <a:t>my-essay_2015-09-01 </a:t>
+            </a:r>
+            <a:r>
+              <a:rPr lang="en-US" dirty="0" smtClean="0"/>
+              <a:t>		</a:t>
+            </a:r>
+            <a:r>
+              <a:rPr lang="en-US" dirty="0" smtClean="0"/>
+              <a:t>my-essay_2015-09-10</a:t>
+            </a:r>
+            <a:endParaRPr lang="en-US" dirty="0" smtClean="0"/>
+          </a:p>
+          <a:p>
+            <a:r>
+              <a:rPr lang="en-US" dirty="0" smtClean="0"/>
+              <a:t>my-essay_2015-09-19</a:t>
+            </a:r>
+            <a:r>
+              <a:rPr lang="en-US" dirty="0" smtClean="0"/>
+              <a:t>	</a:t>
             </a:r>
             <a:r>
               <a:rPr lang="en-US" dirty="0"/>
@@ -10363,8 +10655,9 @@
             </a:r>
             <a:r>
               <a:rPr lang="en-US" dirty="0" smtClean="0"/>
-              <a:t>s5secretsgg_2015-09-28</a:t>
-            </a:r>
+              <a:t>my-essay_2015-09-28</a:t>
+            </a:r>
+            <a:endParaRPr lang="en-US" dirty="0" smtClean="0"/>
           </a:p>
           <a:p>
             <a:endParaRPr lang="en-US" dirty="0" smtClean="0"/>
@@ -10443,12 +10736,7 @@
             <p:ph type="title"/>
           </p:nvPr>
         </p:nvSpPr>
-        <p:spPr>
-          <a:xfrm>
-            <a:off x="1295401" y="831273"/>
-            <a:ext cx="9590550" cy="857071"/>
-          </a:xfrm>
-        </p:spPr>
+        <p:spPr/>
         <p:txBody>
           <a:bodyPr/>
           <a:lstStyle/>
@@ -10459,7 +10747,7 @@
             </a:r>
             <a:r>
               <a:rPr lang="en-US" dirty="0" smtClean="0"/>
-              <a:t>hat is a git</a:t>
+              <a:t>hy use version control</a:t>
             </a:r>
             <a:endParaRPr lang="en-US" dirty="0"/>
           </a:p>
@@ -10467,7 +10755,7 @@
       </p:sp>
       <p:sp>
         <p:nvSpPr>
-          <p:cNvPr id="5" name="Text Placeholder 4"/>
+          <p:cNvPr id="4" name="Content Placeholder 3"/>
           <p:cNvSpPr>
             <a:spLocks noGrp="1"/>
           </p:cNvSpPr>
@@ -10481,75 +10769,25 @@
           <a:lstStyle/>
           <a:p>
             <a:r>
+              <a:rPr lang="en-US" dirty="0" smtClean="0"/>
+              <a:t>let's </a:t>
+            </a:r>
+            <a:r>
               <a:rPr lang="en-US" dirty="0"/>
-              <a:t>g</a:t>
-            </a:r>
-            <a:r>
-              <a:rPr lang="en-US" dirty="0" smtClean="0"/>
-              <a:t>it: [informal] </a:t>
-            </a:r>
-            <a:r>
-              <a:rPr lang="en-US" dirty="0"/>
-              <a:t>[British] an unpleasant or contemptible person.</a:t>
-            </a:r>
-          </a:p>
-        </p:txBody>
-      </p:sp>
-      <p:pic>
-        <p:nvPicPr>
-          <p:cNvPr id="3" name="Picture 2" descr="https://anotherjavaduke.files.wordpress.com/2014/06/quote-i-m-an-egotistical-bastard-and-i-name-all-my-projects-after-myself-first-linux-now-git-linus-torvalds-273567.jpg"/>
-          <p:cNvPicPr>
-            <a:picLocks noChangeAspect="1" noChangeArrowheads="1"/>
-          </p:cNvPicPr>
-          <p:nvPr/>
-        </p:nvPicPr>
-        <p:blipFill rotWithShape="1">
-          <a:blip r:embed="rId2">
-            <a:extLst>
-              <a:ext uri="{28A0092B-C50C-407E-A947-70E740481C1C}">
-                <a14:useLocalDpi xmlns:a14="http://schemas.microsoft.com/office/drawing/2010/main"/>
-              </a:ext>
-            </a:extLst>
-          </a:blip>
-          <a:srcRect l="2157" t="9770" r="2094" b="11434"/>
-          <a:stretch/>
-        </p:blipFill>
-        <p:spPr bwMode="auto">
-          <a:xfrm>
-            <a:off x="2217218" y="2362874"/>
-            <a:ext cx="7752170" cy="3002145"/>
-          </a:xfrm>
-          <a:prstGeom prst="rect">
-            <a:avLst/>
-          </a:prstGeom>
-          <a:ln w="127000" cap="sq">
-            <a:solidFill>
-              <a:srgbClr val="000000"/>
-            </a:solidFill>
-            <a:miter lim="800000"/>
-          </a:ln>
-          <a:effectLst>
-            <a:outerShdw blurRad="57150" dist="50800" dir="2700000" algn="tl" rotWithShape="0">
-              <a:srgbClr val="000000">
-                <a:alpha val="40000"/>
-              </a:srgbClr>
-            </a:outerShdw>
-          </a:effectLst>
-          <a:extLst>
-            <a:ext uri="{909E8E84-426E-40DD-AFC4-6F175D3DCCD1}">
-              <a14:hiddenFill xmlns:a14="http://schemas.microsoft.com/office/drawing/2010/main">
-                <a:solidFill>
-                  <a:srgbClr val="FFFFFF"/>
-                </a:solidFill>
-              </a14:hiddenFill>
-            </a:ext>
-          </a:extLst>
-        </p:spPr>
-      </p:pic>
+              <a:t>talk </a:t>
+            </a:r>
+            <a:r>
+              <a:rPr lang="en-US" dirty="0" smtClean="0"/>
+              <a:t>workflow</a:t>
+            </a:r>
+            <a:endParaRPr lang="en-US" dirty="0"/>
+          </a:p>
+        </p:txBody>
+      </p:sp>
     </p:spTree>
     <p:extLst>
       <p:ext uri="{BB962C8B-B14F-4D97-AF65-F5344CB8AC3E}">
-        <p14:creationId xmlns:p14="http://schemas.microsoft.com/office/powerpoint/2010/main" val="3400810153"/>
+        <p14:creationId xmlns:p14="http://schemas.microsoft.com/office/powerpoint/2010/main" val="183186093"/>
       </p:ext>
     </p:extLst>
   </p:cSld>
@@ -10651,13 +10889,34 @@
           <a:p>
             <a:r>
               <a:rPr lang="en-US" dirty="0" smtClean="0"/>
-              <a:t>s5secretsgg		s5secretsgg_2015-09-01 		s5secretsgg_2015-09-10</a:t>
-            </a:r>
-          </a:p>
-          <a:p>
-            <a:r>
-              <a:rPr lang="en-US" dirty="0" smtClean="0"/>
-              <a:t>s5secretsgg_2015-09-19	</a:t>
+              <a:t>my-essay</a:t>
+            </a:r>
+            <a:r>
+              <a:rPr lang="en-US" dirty="0" smtClean="0"/>
+              <a:t>		</a:t>
+            </a:r>
+            <a:r>
+              <a:rPr lang="en-US" dirty="0" smtClean="0"/>
+              <a:t>my-essay_2015-09-01 </a:t>
+            </a:r>
+            <a:r>
+              <a:rPr lang="en-US" dirty="0" smtClean="0"/>
+              <a:t>		</a:t>
+            </a:r>
+            <a:r>
+              <a:rPr lang="en-US" dirty="0" smtClean="0"/>
+              <a:t>my-essay_2015-09-10</a:t>
+            </a:r>
+            <a:endParaRPr lang="en-US" dirty="0" smtClean="0"/>
+          </a:p>
+          <a:p>
+            <a:r>
+              <a:rPr lang="en-US" dirty="0" smtClean="0"/>
+              <a:t>my-essay_2015-09-19</a:t>
+            </a:r>
+            <a:r>
+              <a:rPr lang="en-US" dirty="0" smtClean="0"/>
+              <a:t>	</a:t>
             </a:r>
             <a:r>
               <a:rPr lang="en-US" dirty="0"/>
@@ -10665,8 +10924,9 @@
             </a:r>
             <a:r>
               <a:rPr lang="en-US" dirty="0" smtClean="0"/>
-              <a:t>s5secretsgg_2015-09-28</a:t>
-            </a:r>
+              <a:t>my-essay_2015-09-28</a:t>
+            </a:r>
+            <a:endParaRPr lang="en-US" dirty="0" smtClean="0"/>
           </a:p>
           <a:p>
             <a:endParaRPr lang="en-US" dirty="0" smtClean="0"/>
@@ -10769,13 +11029,21 @@
           <a:p>
             <a:r>
               <a:rPr lang="en-US" dirty="0" smtClean="0"/>
-              <a:t>let’s shift gears for a minute…</a:t>
-            </a:r>
-          </a:p>
-          <a:p>
-            <a:r>
-              <a:rPr lang="en-US" dirty="0" smtClean="0"/>
-              <a:t>let’s talk </a:t>
+              <a:t>let's </a:t>
+            </a:r>
+            <a:r>
+              <a:rPr lang="en-US" dirty="0" smtClean="0"/>
+              <a:t>shift gears for a minute…</a:t>
+            </a:r>
+          </a:p>
+          <a:p>
+            <a:r>
+              <a:rPr lang="en-US" dirty="0" smtClean="0"/>
+              <a:t>let's </a:t>
+            </a:r>
+            <a:r>
+              <a:rPr lang="en-US" dirty="0" smtClean="0"/>
+              <a:t>talk </a:t>
             </a:r>
             <a:r>
               <a:rPr lang="en-US" i="1" dirty="0" smtClean="0"/>
@@ -10852,8 +11120,20 @@
           <a:lstStyle/>
           <a:p>
             <a:r>
-              <a:rPr lang="en-US" dirty="0" smtClean="0"/>
-              <a:t>why use git</a:t>
+              <a:rPr lang="en-US" dirty="0"/>
+              <a:t>w</a:t>
+            </a:r>
+            <a:r>
+              <a:rPr lang="en-US" dirty="0" smtClean="0"/>
+              <a:t>hat is </a:t>
+            </a:r>
+            <a:r>
+              <a:rPr lang="en-US" dirty="0"/>
+              <a:t>g</a:t>
+            </a:r>
+            <a:r>
+              <a:rPr lang="en-US" dirty="0" smtClean="0"/>
+              <a:t>it</a:t>
             </a:r>
             <a:endParaRPr lang="en-US" dirty="0"/>
           </a:p>
@@ -10861,7 +11141,7 @@
       </p:sp>
       <p:sp>
         <p:nvSpPr>
-          <p:cNvPr id="4" name="Text Placeholder 3"/>
+          <p:cNvPr id="5" name="Text Placeholder 4"/>
           <p:cNvSpPr>
             <a:spLocks noGrp="1"/>
           </p:cNvSpPr>
@@ -10869,35 +11149,21 @@
             <p:ph type="body" idx="1"/>
           </p:nvPr>
         </p:nvSpPr>
-        <p:spPr>
-          <a:xfrm>
-            <a:off x="1295401" y="3579488"/>
-            <a:ext cx="9590550" cy="2156294"/>
-          </a:xfrm>
-        </p:spPr>
+        <p:spPr/>
         <p:txBody>
           <a:bodyPr>
             <a:normAutofit/>
           </a:bodyPr>
           <a:lstStyle/>
           <a:p>
-            <a:r>
-              <a:rPr lang="en-US" dirty="0" smtClean="0"/>
-              <a:t>you have all these iterative backups</a:t>
-            </a:r>
-          </a:p>
-          <a:p>
-            <a:r>
-              <a:rPr lang="en-US" dirty="0" smtClean="0"/>
-              <a:t>how do you manage them all</a:t>
-            </a:r>
+            <a:endParaRPr lang="en-US" dirty="0" smtClean="0"/>
           </a:p>
         </p:txBody>
       </p:sp>
     </p:spTree>
     <p:extLst>
       <p:ext uri="{BB962C8B-B14F-4D97-AF65-F5344CB8AC3E}">
-        <p14:creationId xmlns:p14="http://schemas.microsoft.com/office/powerpoint/2010/main" val="1271287658"/>
+        <p14:creationId xmlns:p14="http://schemas.microsoft.com/office/powerpoint/2010/main" val="2140695221"/>
       </p:ext>
     </p:extLst>
   </p:cSld>
@@ -10959,8 +11225,20 @@
           <a:lstStyle/>
           <a:p>
             <a:r>
-              <a:rPr lang="en-US" dirty="0" smtClean="0"/>
-              <a:t>why use git</a:t>
+              <a:rPr lang="en-US" dirty="0"/>
+              <a:t>w</a:t>
+            </a:r>
+            <a:r>
+              <a:rPr lang="en-US" dirty="0" smtClean="0"/>
+              <a:t>hat is </a:t>
+            </a:r>
+            <a:r>
+              <a:rPr lang="en-US" dirty="0"/>
+              <a:t>g</a:t>
+            </a:r>
+            <a:r>
+              <a:rPr lang="en-US" dirty="0" smtClean="0"/>
+              <a:t>it</a:t>
             </a:r>
             <a:endParaRPr lang="en-US" dirty="0"/>
           </a:p>
@@ -10968,7 +11246,7 @@
       </p:sp>
       <p:sp>
         <p:nvSpPr>
-          <p:cNvPr id="4" name="Text Placeholder 3"/>
+          <p:cNvPr id="5" name="Text Placeholder 4"/>
           <p:cNvSpPr>
             <a:spLocks noGrp="1"/>
           </p:cNvSpPr>
@@ -10976,12 +11254,7 @@
             <p:ph type="body" idx="1"/>
           </p:nvPr>
         </p:nvSpPr>
-        <p:spPr>
-          <a:xfrm>
-            <a:off x="1295401" y="3579488"/>
-            <a:ext cx="9590550" cy="2156294"/>
-          </a:xfrm>
-        </p:spPr>
+        <p:spPr/>
         <p:txBody>
           <a:bodyPr>
             <a:normAutofit/>
@@ -10989,26 +11262,43 @@
           <a:lstStyle/>
           <a:p>
             <a:r>
+              <a:rPr lang="en-US" dirty="0" smtClean="0"/>
+              <a:t>git: A distributed revision </a:t>
+            </a:r>
+            <a:r>
               <a:rPr lang="en-US" dirty="0"/>
-              <a:t>g</a:t>
-            </a:r>
-            <a:r>
-              <a:rPr lang="en-US" dirty="0" smtClean="0"/>
-              <a:t>it pros</a:t>
-            </a:r>
-          </a:p>
-          <a:p>
-            <a:r>
-              <a:rPr lang="en-US" dirty="0" smtClean="0"/>
-              <a:t>git cons</a:t>
-            </a:r>
+              <a:t>control system </a:t>
+            </a:r>
+            <a:r>
+              <a:rPr lang="en-US" dirty="0" smtClean="0"/>
+              <a:t>with…support </a:t>
+            </a:r>
+            <a:r>
+              <a:rPr lang="en-US" dirty="0"/>
+              <a:t>for distributed, non-linear workflows</a:t>
+            </a:r>
+            <a:r>
+              <a:rPr lang="en-US" dirty="0" smtClean="0"/>
+              <a:t>. [Wikipedia – Git (software</a:t>
+            </a:r>
+            <a:r>
+              <a:rPr lang="en-US" dirty="0" smtClean="0"/>
+              <a:t>)]</a:t>
+            </a:r>
+          </a:p>
+          <a:p>
+            <a:r>
+              <a:rPr lang="en-US" dirty="0" smtClean="0"/>
+              <a:t>…</a:t>
+            </a:r>
+            <a:endParaRPr lang="en-US" dirty="0" smtClean="0"/>
           </a:p>
         </p:txBody>
       </p:sp>
     </p:spTree>
     <p:extLst>
       <p:ext uri="{BB962C8B-B14F-4D97-AF65-F5344CB8AC3E}">
-        <p14:creationId xmlns:p14="http://schemas.microsoft.com/office/powerpoint/2010/main" val="3784632046"/>
+        <p14:creationId xmlns:p14="http://schemas.microsoft.com/office/powerpoint/2010/main" val="1971189786"/>
       </p:ext>
     </p:extLst>
   </p:cSld>
@@ -11070,8 +11360,12 @@
           <a:lstStyle/>
           <a:p>
             <a:r>
-              <a:rPr lang="en-US" dirty="0" smtClean="0"/>
-              <a:t>git con</a:t>
+              <a:rPr lang="en-US" dirty="0"/>
+              <a:t>w</a:t>
+            </a:r>
+            <a:r>
+              <a:rPr lang="en-US" dirty="0" smtClean="0"/>
+              <a:t>hat is git</a:t>
             </a:r>
             <a:endParaRPr lang="en-US" dirty="0"/>
           </a:p>
@@ -11079,7 +11373,7 @@
       </p:sp>
       <p:sp>
         <p:nvSpPr>
-          <p:cNvPr id="4" name="Text Placeholder 3"/>
+          <p:cNvPr id="5" name="Text Placeholder 4"/>
           <p:cNvSpPr>
             <a:spLocks noGrp="1"/>
           </p:cNvSpPr>
@@ -11087,12 +11381,7 @@
             <p:ph type="body" idx="1"/>
           </p:nvPr>
         </p:nvSpPr>
-        <p:spPr>
-          <a:xfrm>
-            <a:off x="1295401" y="3579488"/>
-            <a:ext cx="9590550" cy="2156294"/>
-          </a:xfrm>
-        </p:spPr>
+        <p:spPr/>
         <p:txBody>
           <a:bodyPr>
             <a:normAutofit/>
@@ -11101,29 +11390,8 @@
           <a:p>
             <a:r>
               <a:rPr lang="en-US" dirty="0" smtClean="0"/>
-              <a:t>considered very hard to learn</a:t>
-            </a:r>
-          </a:p>
-          <a:p>
-            <a:r>
-              <a:rPr lang="en-US" dirty="0" smtClean="0"/>
-              <a:t>lots of weird syntax</a:t>
-            </a:r>
-          </a:p>
-          <a:p>
-            <a:endParaRPr lang="en-US" dirty="0"/>
-          </a:p>
-          <a:p>
-            <a:r>
-              <a:rPr lang="en-US" b="1" dirty="0" smtClean="0"/>
-              <a:t>understanding </a:t>
-            </a:r>
-            <a:r>
-              <a:rPr lang="en-US" dirty="0" smtClean="0"/>
-              <a:t>git internals helps remedy this tremendously</a:t>
-            </a:r>
-          </a:p>
-          <a:p>
+              <a:t>…</a:t>
+            </a:r>
             <a:endParaRPr lang="en-US" dirty="0" smtClean="0"/>
           </a:p>
         </p:txBody>
@@ -11131,7 +11399,7 @@
     </p:spTree>
     <p:extLst>
       <p:ext uri="{BB962C8B-B14F-4D97-AF65-F5344CB8AC3E}">
-        <p14:creationId xmlns:p14="http://schemas.microsoft.com/office/powerpoint/2010/main" val="759806212"/>
+        <p14:creationId xmlns:p14="http://schemas.microsoft.com/office/powerpoint/2010/main" val="3809877931"/>
       </p:ext>
     </p:extLst>
   </p:cSld>
@@ -11193,8 +11461,12 @@
           <a:lstStyle/>
           <a:p>
             <a:r>
-              <a:rPr lang="en-US" dirty="0" smtClean="0"/>
-              <a:t>terminal vs GUI</a:t>
+              <a:rPr lang="en-US" dirty="0"/>
+              <a:t>w</a:t>
+            </a:r>
+            <a:r>
+              <a:rPr lang="en-US" dirty="0" smtClean="0"/>
+              <a:t>hat is git</a:t>
             </a:r>
             <a:endParaRPr lang="en-US" dirty="0"/>
           </a:p>
@@ -11202,7 +11474,7 @@
       </p:sp>
       <p:sp>
         <p:nvSpPr>
-          <p:cNvPr id="4" name="Text Placeholder 3"/>
+          <p:cNvPr id="5" name="Text Placeholder 4"/>
           <p:cNvSpPr>
             <a:spLocks noGrp="1"/>
           </p:cNvSpPr>
@@ -11210,12 +11482,7 @@
             <p:ph type="body" idx="1"/>
           </p:nvPr>
         </p:nvSpPr>
-        <p:spPr>
-          <a:xfrm>
-            <a:off x="1295401" y="3579488"/>
-            <a:ext cx="9590550" cy="2156294"/>
-          </a:xfrm>
-        </p:spPr>
+        <p:spPr/>
         <p:txBody>
           <a:bodyPr>
             <a:normAutofit/>
@@ -11224,45 +11491,30 @@
           <a:p>
             <a:r>
               <a:rPr lang="en-US" dirty="0" smtClean="0"/>
-              <a:t>terminal way is best way</a:t>
-            </a:r>
-          </a:p>
-          <a:p>
-            <a:r>
-              <a:rPr lang="en-US" dirty="0" smtClean="0"/>
-              <a:t>but nefari0uss – that </a:t>
-            </a:r>
-            <a:r>
-              <a:rPr lang="en-US" dirty="0" err="1" smtClean="0"/>
-              <a:t>gui</a:t>
-            </a:r>
-            <a:r>
-              <a:rPr lang="en-US" dirty="0" smtClean="0"/>
-              <a:t> application looks so nice and pretty</a:t>
+              <a:t>…</a:t>
             </a:r>
           </a:p>
           <a:p>
             <a:r>
               <a:rPr lang="en-US" dirty="0"/>
-              <a:t>a</a:t>
-            </a:r>
-            <a:r>
-              <a:rPr lang="en-US" dirty="0" smtClean="0"/>
-              <a:t>nd that terminal looks scary and hard</a:t>
-            </a:r>
-          </a:p>
-          <a:p>
-            <a:r>
-              <a:rPr lang="en-US" dirty="0" smtClean="0"/>
-              <a:t>I don’t care</a:t>
-            </a:r>
+              <a:t>t</a:t>
+            </a:r>
+            <a:r>
+              <a:rPr lang="en-US" dirty="0" smtClean="0"/>
+              <a:t>ry this</a:t>
+            </a:r>
+            <a:r>
+              <a:rPr lang="en-US" dirty="0" smtClean="0"/>
+              <a:t>:</a:t>
+            </a:r>
+            <a:endParaRPr lang="en-US" dirty="0" smtClean="0"/>
           </a:p>
         </p:txBody>
       </p:sp>
     </p:spTree>
     <p:extLst>
       <p:ext uri="{BB962C8B-B14F-4D97-AF65-F5344CB8AC3E}">
-        <p14:creationId xmlns:p14="http://schemas.microsoft.com/office/powerpoint/2010/main" val="195693257"/>
+        <p14:creationId xmlns:p14="http://schemas.microsoft.com/office/powerpoint/2010/main" val="950961579"/>
       </p:ext>
     </p:extLst>
   </p:cSld>
@@ -11323,13 +11575,21 @@
           <a:bodyPr/>
           <a:lstStyle/>
           <a:p>
+            <a:r>
+              <a:rPr lang="en-US" dirty="0"/>
+              <a:t>w</a:t>
+            </a:r>
+            <a:r>
+              <a:rPr lang="en-US" dirty="0" smtClean="0"/>
+              <a:t>hat is git</a:t>
+            </a:r>
             <a:endParaRPr lang="en-US" dirty="0"/>
           </a:p>
         </p:txBody>
       </p:sp>
       <p:sp>
         <p:nvSpPr>
-          <p:cNvPr id="3" name="Text Placeholder 2"/>
+          <p:cNvPr id="5" name="Text Placeholder 4"/>
           <p:cNvSpPr>
             <a:spLocks noGrp="1"/>
           </p:cNvSpPr>
@@ -11339,58 +11599,44 @@
         </p:nvSpPr>
         <p:spPr/>
         <p:txBody>
-          <a:bodyPr/>
-          <a:lstStyle/>
-          <a:p>
-            <a:endParaRPr lang="en-US"/>
-          </a:p>
-        </p:txBody>
-      </p:sp>
-      <p:pic>
-        <p:nvPicPr>
-          <p:cNvPr id="4" name="Picture 2" descr="tNG7G.png"/>
-          <p:cNvPicPr>
-            <a:picLocks noChangeAspect="1" noChangeArrowheads="1"/>
-          </p:cNvPicPr>
-          <p:nvPr/>
-        </p:nvPicPr>
-        <p:blipFill>
-          <a:blip r:embed="rId2">
-            <a:extLst>
-              <a:ext uri="{28A0092B-C50C-407E-A947-70E740481C1C}">
-                <a14:useLocalDpi xmlns:a14="http://schemas.microsoft.com/office/drawing/2010/main"/>
-              </a:ext>
-            </a:extLst>
-          </a:blip>
-          <a:srcRect/>
-          <a:stretch>
-            <a:fillRect/>
-          </a:stretch>
-        </p:blipFill>
-        <p:spPr bwMode="auto">
-          <a:xfrm>
-            <a:off x="372234" y="218588"/>
-            <a:ext cx="11385494" cy="6421982"/>
-          </a:xfrm>
-          <a:prstGeom prst="rect">
-            <a:avLst/>
-          </a:prstGeom>
-          <a:noFill/>
-          <a:extLst>
-            <a:ext uri="{909E8E84-426E-40DD-AFC4-6F175D3DCCD1}">
-              <a14:hiddenFill xmlns:a14="http://schemas.microsoft.com/office/drawing/2010/main">
-                <a:solidFill>
-                  <a:srgbClr val="FFFFFF"/>
-                </a:solidFill>
-              </a14:hiddenFill>
-            </a:ext>
-          </a:extLst>
-        </p:spPr>
-      </p:pic>
+          <a:bodyPr>
+            <a:normAutofit fontScale="92500" lnSpcReduction="20000"/>
+          </a:bodyPr>
+          <a:lstStyle/>
+          <a:p>
+            <a:r>
+              <a:rPr lang="en-US" dirty="0" smtClean="0"/>
+              <a:t>…</a:t>
+            </a:r>
+          </a:p>
+          <a:p>
+            <a:r>
+              <a:rPr lang="en-US" dirty="0"/>
+              <a:t>t</a:t>
+            </a:r>
+            <a:r>
+              <a:rPr lang="en-US" dirty="0" smtClean="0"/>
+              <a:t>ry this:</a:t>
+            </a:r>
+          </a:p>
+          <a:p>
+            <a:r>
+              <a:rPr lang="en-US" dirty="0" smtClean="0"/>
+              <a:t>a version control system that allows a user to</a:t>
+            </a:r>
+          </a:p>
+          <a:p>
+            <a:r>
+              <a:rPr lang="en-US" dirty="0" smtClean="0"/>
+              <a:t>store, update, and maintain files and projects.</a:t>
+            </a:r>
+          </a:p>
+        </p:txBody>
+      </p:sp>
     </p:spTree>
     <p:extLst>
       <p:ext uri="{BB962C8B-B14F-4D97-AF65-F5344CB8AC3E}">
-        <p14:creationId xmlns:p14="http://schemas.microsoft.com/office/powerpoint/2010/main" val="285802535"/>
+        <p14:creationId xmlns:p14="http://schemas.microsoft.com/office/powerpoint/2010/main" val="1095682817"/>
       </p:ext>
     </p:extLst>
   </p:cSld>
@@ -11451,13 +11697,17 @@
           <a:bodyPr/>
           <a:lstStyle/>
           <a:p>
-            <a:endParaRPr lang="en-US"/>
-          </a:p>
-        </p:txBody>
-      </p:sp>
-      <p:sp>
-        <p:nvSpPr>
-          <p:cNvPr id="3" name="Text Placeholder 2"/>
+            <a:r>
+              <a:rPr lang="en-US" dirty="0" smtClean="0"/>
+              <a:t>why use git</a:t>
+            </a:r>
+            <a:endParaRPr lang="en-US" dirty="0"/>
+          </a:p>
+        </p:txBody>
+      </p:sp>
+      <p:sp>
+        <p:nvSpPr>
+          <p:cNvPr id="4" name="Text Placeholder 3"/>
           <p:cNvSpPr>
             <a:spLocks noGrp="1"/>
           </p:cNvSpPr>
@@ -11465,60 +11715,35 @@
             <p:ph type="body" idx="1"/>
           </p:nvPr>
         </p:nvSpPr>
-        <p:spPr/>
-        <p:txBody>
-          <a:bodyPr/>
-          <a:lstStyle/>
-          <a:p>
-            <a:endParaRPr lang="en-US"/>
-          </a:p>
-        </p:txBody>
-      </p:sp>
-      <p:pic>
-        <p:nvPicPr>
-          <p:cNvPr id="4" name="Picture 2" descr="tig-2.png"/>
-          <p:cNvPicPr>
-            <a:picLocks noChangeAspect="1" noChangeArrowheads="1"/>
-          </p:cNvPicPr>
-          <p:nvPr/>
-        </p:nvPicPr>
-        <p:blipFill>
-          <a:blip r:embed="rId2">
-            <a:extLst>
-              <a:ext uri="{28A0092B-C50C-407E-A947-70E740481C1C}">
-                <a14:useLocalDpi xmlns:a14="http://schemas.microsoft.com/office/drawing/2010/main"/>
-              </a:ext>
-            </a:extLst>
-          </a:blip>
-          <a:srcRect/>
-          <a:stretch>
-            <a:fillRect/>
-          </a:stretch>
-        </p:blipFill>
-        <p:spPr bwMode="auto">
+        <p:spPr>
           <a:xfrm>
-            <a:off x="1295401" y="396613"/>
-            <a:ext cx="9810750" cy="6124575"/>
+            <a:off x="1295401" y="3579488"/>
+            <a:ext cx="9590550" cy="2156294"/>
           </a:xfrm>
-          <a:prstGeom prst="rect">
-            <a:avLst/>
-          </a:prstGeom>
-          <a:noFill/>
-          <a:extLst>
-            <a:ext uri="{909E8E84-426E-40DD-AFC4-6F175D3DCCD1}">
-              <a14:hiddenFill xmlns:a14="http://schemas.microsoft.com/office/drawing/2010/main">
-                <a:solidFill>
-                  <a:srgbClr val="FFFFFF"/>
-                </a:solidFill>
-              </a14:hiddenFill>
-            </a:ext>
-          </a:extLst>
         </p:spPr>
-      </p:pic>
+        <p:txBody>
+          <a:bodyPr>
+            <a:normAutofit/>
+          </a:bodyPr>
+          <a:lstStyle/>
+          <a:p>
+            <a:r>
+              <a:rPr lang="en-US" dirty="0" smtClean="0"/>
+              <a:t>you have all these iterative backups</a:t>
+            </a:r>
+          </a:p>
+          <a:p>
+            <a:r>
+              <a:rPr lang="en-US" dirty="0" smtClean="0"/>
+              <a:t>how do you manage them all</a:t>
+            </a:r>
+          </a:p>
+        </p:txBody>
+      </p:sp>
     </p:spTree>
     <p:extLst>
       <p:ext uri="{BB962C8B-B14F-4D97-AF65-F5344CB8AC3E}">
-        <p14:creationId xmlns:p14="http://schemas.microsoft.com/office/powerpoint/2010/main" val="1101699994"/>
+        <p14:creationId xmlns:p14="http://schemas.microsoft.com/office/powerpoint/2010/main" val="2415723281"/>
       </p:ext>
     </p:extLst>
   </p:cSld>
@@ -11581,7 +11806,7 @@
           <a:p>
             <a:r>
               <a:rPr lang="en-US" dirty="0" smtClean="0"/>
-              <a:t>terminal vs GUI</a:t>
+              <a:t>going back…</a:t>
             </a:r>
             <a:endParaRPr lang="en-US" dirty="0"/>
           </a:p>
@@ -11605,54 +11830,13 @@
         </p:spPr>
         <p:txBody>
           <a:bodyPr>
-            <a:normAutofit lnSpcReduction="10000"/>
+            <a:normAutofit/>
           </a:bodyPr>
           <a:lstStyle/>
           <a:p>
             <a:r>
-              <a:rPr lang="en-US" dirty="0" err="1" smtClean="0"/>
-              <a:t>gui</a:t>
-            </a:r>
-            <a:r>
-              <a:rPr lang="en-US" dirty="0" smtClean="0"/>
-              <a:t> applications hide what’s happening</a:t>
-            </a:r>
-          </a:p>
-          <a:p>
-            <a:r>
-              <a:rPr lang="en-US" dirty="0" smtClean="0"/>
-              <a:t>terminal way forces you to learn what’s happening</a:t>
-            </a:r>
-          </a:p>
-          <a:p>
-            <a:r>
-              <a:rPr lang="en-US" dirty="0" smtClean="0"/>
-              <a:t>Murphy’s law </a:t>
-            </a:r>
-            <a:r>
-              <a:rPr lang="en-US" b="1" i="1" dirty="0" smtClean="0"/>
-              <a:t>will</a:t>
-            </a:r>
-            <a:r>
-              <a:rPr lang="en-US" dirty="0" smtClean="0"/>
-              <a:t> happen</a:t>
-            </a:r>
-          </a:p>
-          <a:p>
-            <a:r>
-              <a:rPr lang="en-US" dirty="0"/>
-              <a:t>your code base will become </a:t>
-            </a:r>
-            <a:r>
-              <a:rPr lang="en-US" dirty="0" err="1"/>
-              <a:t>borked</a:t>
-            </a:r>
-            <a:endParaRPr lang="en-US" dirty="0"/>
-          </a:p>
-          <a:p>
-            <a:r>
-              <a:rPr lang="en-US" dirty="0" smtClean="0"/>
-              <a:t>knowing how git works will help you fix it</a:t>
+              <a:rPr lang="en-US" dirty="0" smtClean="0"/>
+              <a:t>remember this?</a:t>
             </a:r>
           </a:p>
         </p:txBody>
@@ -11660,7 +11844,7 @@
     </p:spTree>
     <p:extLst>
       <p:ext uri="{BB962C8B-B14F-4D97-AF65-F5344CB8AC3E}">
-        <p14:creationId xmlns:p14="http://schemas.microsoft.com/office/powerpoint/2010/main" val="3648326466"/>
+        <p14:creationId xmlns:p14="http://schemas.microsoft.com/office/powerpoint/2010/main" val="3419472674"/>
       </p:ext>
     </p:extLst>
   </p:cSld>
@@ -11721,6 +11905,10 @@
           <a:bodyPr/>
           <a:lstStyle/>
           <a:p>
+            <a:r>
+              <a:rPr lang="en-US" dirty="0" smtClean="0"/>
+              <a:t>new problem</a:t>
+            </a:r>
             <a:endParaRPr lang="en-US" dirty="0"/>
           </a:p>
         </p:txBody>
@@ -11737,8 +11925,8 @@
         </p:nvSpPr>
         <p:spPr>
           <a:xfrm>
-            <a:off x="1295401" y="5866355"/>
-            <a:ext cx="9590550" cy="523174"/>
+            <a:off x="1295401" y="3579488"/>
+            <a:ext cx="9590550" cy="2156294"/>
           </a:xfrm>
         </p:spPr>
         <p:txBody>
@@ -11748,58 +11936,64 @@
           <a:lstStyle/>
           <a:p>
             <a:r>
+              <a:rPr lang="en-US" dirty="0" smtClean="0"/>
+              <a:t>which backup has the info we need</a:t>
+            </a:r>
+          </a:p>
+          <a:p>
+            <a:endParaRPr lang="en-US" dirty="0"/>
+          </a:p>
+          <a:p>
+            <a:r>
+              <a:rPr lang="en-US" dirty="0" smtClean="0"/>
+              <a:t>my-essay</a:t>
+            </a:r>
+            <a:r>
+              <a:rPr lang="en-US" dirty="0" smtClean="0"/>
+              <a:t>		</a:t>
+            </a:r>
+            <a:r>
+              <a:rPr lang="en-US" dirty="0" smtClean="0"/>
+              <a:t>my-essay_2015-09-01 </a:t>
+            </a:r>
+            <a:r>
+              <a:rPr lang="en-US" dirty="0" smtClean="0"/>
+              <a:t>		</a:t>
+            </a:r>
+            <a:r>
+              <a:rPr lang="en-US" dirty="0" smtClean="0"/>
+              <a:t>my-essay_2015-09-10</a:t>
+            </a:r>
+            <a:endParaRPr lang="en-US" dirty="0" smtClean="0"/>
+          </a:p>
+          <a:p>
+            <a:r>
+              <a:rPr lang="en-US" dirty="0" smtClean="0"/>
+              <a:t>my-essay_2015-09-19</a:t>
+            </a:r>
+            <a:r>
+              <a:rPr lang="en-US" dirty="0" smtClean="0"/>
+              <a:t>	</a:t>
+            </a:r>
+            <a:r>
               <a:rPr lang="en-US" dirty="0"/>
-              <a:t>https://xkcd.com/1597/</a:t>
+              <a:t> </a:t>
+            </a:r>
+            <a:r>
+              <a:rPr lang="en-US" dirty="0" smtClean="0"/>
+              <a:t>my-essay_2015-09-28</a:t>
             </a:r>
             <a:endParaRPr lang="en-US" dirty="0" smtClean="0"/>
           </a:p>
-        </p:txBody>
-      </p:sp>
-      <p:pic>
-        <p:nvPicPr>
-          <p:cNvPr id="3074" name="Picture 2" descr="Git"/>
-          <p:cNvPicPr>
-            <a:picLocks noChangeAspect="1" noChangeArrowheads="1"/>
-          </p:cNvPicPr>
-          <p:nvPr/>
-        </p:nvPicPr>
-        <p:blipFill>
-          <a:blip r:embed="rId2">
-            <a:extLst>
-              <a:ext uri="{28A0092B-C50C-407E-A947-70E740481C1C}">
-                <a14:useLocalDpi xmlns:a14="http://schemas.microsoft.com/office/drawing/2010/main"/>
-              </a:ext>
-            </a:extLst>
-          </a:blip>
-          <a:srcRect/>
-          <a:stretch>
-            <a:fillRect/>
-          </a:stretch>
-        </p:blipFill>
-        <p:spPr bwMode="auto">
-          <a:xfrm>
-            <a:off x="3361889" y="339865"/>
-            <a:ext cx="5070011" cy="5526490"/>
-          </a:xfrm>
-          <a:prstGeom prst="rect">
-            <a:avLst/>
-          </a:prstGeom>
-          <a:noFill/>
-          <a:extLst>
-            <a:ext uri="{909E8E84-426E-40DD-AFC4-6F175D3DCCD1}">
-              <a14:hiddenFill xmlns:a14="http://schemas.microsoft.com/office/drawing/2010/main">
-                <a:solidFill>
-                  <a:srgbClr val="FFFFFF"/>
-                </a:solidFill>
-              </a14:hiddenFill>
-            </a:ext>
-          </a:extLst>
-        </p:spPr>
-      </p:pic>
+          <a:p>
+            <a:endParaRPr lang="en-US" dirty="0" smtClean="0"/>
+          </a:p>
+        </p:txBody>
+      </p:sp>
     </p:spTree>
     <p:extLst>
       <p:ext uri="{BB962C8B-B14F-4D97-AF65-F5344CB8AC3E}">
-        <p14:creationId xmlns:p14="http://schemas.microsoft.com/office/powerpoint/2010/main" val="582727160"/>
+        <p14:creationId xmlns:p14="http://schemas.microsoft.com/office/powerpoint/2010/main" val="665420287"/>
       </p:ext>
     </p:extLst>
   </p:cSld>
@@ -11861,20 +12055,12 @@
           <a:lstStyle/>
           <a:p>
             <a:r>
-              <a:rPr lang="en-US" dirty="0"/>
-              <a:t>w</a:t>
-            </a:r>
-            <a:r>
-              <a:rPr lang="en-US" dirty="0" smtClean="0"/>
-              <a:t>hat is </a:t>
-            </a:r>
-            <a:r>
-              <a:rPr lang="en-US" dirty="0"/>
-              <a:t>g</a:t>
-            </a:r>
-            <a:r>
-              <a:rPr lang="en-US" dirty="0" smtClean="0"/>
-              <a:t>it</a:t>
+              <a:rPr lang="en-US" dirty="0" smtClean="0"/>
+              <a:t>let's </a:t>
+            </a:r>
+            <a:r>
+              <a:rPr lang="en-US" dirty="0" smtClean="0"/>
+              <a:t>talk workflow</a:t>
             </a:r>
             <a:endParaRPr lang="en-US" dirty="0"/>
           </a:p>
@@ -11882,7 +12068,7 @@
       </p:sp>
       <p:sp>
         <p:nvSpPr>
-          <p:cNvPr id="5" name="Text Placeholder 4"/>
+          <p:cNvPr id="4" name="Content Placeholder 3"/>
           <p:cNvSpPr>
             <a:spLocks noGrp="1"/>
           </p:cNvSpPr>
@@ -11892,38 +12078,17 @@
         </p:nvSpPr>
         <p:spPr/>
         <p:txBody>
-          <a:bodyPr>
-            <a:normAutofit/>
-          </a:bodyPr>
-          <a:lstStyle/>
-          <a:p>
-            <a:r>
-              <a:rPr lang="en-US" dirty="0" smtClean="0"/>
-              <a:t>git: A distributed revision </a:t>
-            </a:r>
-            <a:r>
-              <a:rPr lang="en-US" dirty="0"/>
-              <a:t>control system </a:t>
-            </a:r>
-            <a:r>
-              <a:rPr lang="en-US" dirty="0" smtClean="0"/>
-              <a:t>with…support </a:t>
-            </a:r>
-            <a:r>
-              <a:rPr lang="en-US" dirty="0"/>
-              <a:t>for distributed, non-linear workflows</a:t>
-            </a:r>
-            <a:r>
-              <a:rPr lang="en-US" dirty="0" smtClean="0"/>
-              <a:t>. [Wikipedia – Git (software)]</a:t>
-            </a:r>
+          <a:bodyPr/>
+          <a:lstStyle/>
+          <a:p>
+            <a:endParaRPr lang="en-US" dirty="0"/>
           </a:p>
         </p:txBody>
       </p:sp>
     </p:spTree>
     <p:extLst>
       <p:ext uri="{BB962C8B-B14F-4D97-AF65-F5344CB8AC3E}">
-        <p14:creationId xmlns:p14="http://schemas.microsoft.com/office/powerpoint/2010/main" val="2920826731"/>
+        <p14:creationId xmlns:p14="http://schemas.microsoft.com/office/powerpoint/2010/main" val="2856505888"/>
       </p:ext>
     </p:extLst>
   </p:cSld>
@@ -11986,7 +12151,7 @@
           <a:p>
             <a:r>
               <a:rPr lang="en-US" dirty="0" smtClean="0"/>
-              <a:t>terminal vs GUI</a:t>
+              <a:t>new problem</a:t>
             </a:r>
             <a:endParaRPr lang="en-US" dirty="0"/>
           </a:p>
@@ -12015,80 +12180,29 @@
           <a:lstStyle/>
           <a:p>
             <a:r>
-              <a:rPr lang="en-US" dirty="0" err="1" smtClean="0"/>
-              <a:t>gui</a:t>
-            </a:r>
-            <a:r>
-              <a:rPr lang="en-US" dirty="0" smtClean="0"/>
-              <a:t> may not always be available</a:t>
-            </a:r>
-          </a:p>
-          <a:p>
-            <a:r>
-              <a:rPr lang="en-US" dirty="0" smtClean="0"/>
-              <a:t>terminal will</a:t>
-            </a:r>
-          </a:p>
-          <a:p>
-            <a:endParaRPr lang="en-US" dirty="0" smtClean="0"/>
-          </a:p>
-          <a:p>
-            <a:r>
-              <a:rPr lang="bo-CN" dirty="0" smtClean="0"/>
-              <a:t>༼ </a:t>
-            </a:r>
-            <a:r>
-              <a:rPr lang="ja-JP" altLang="en-US" dirty="0" smtClean="0"/>
-              <a:t>つ ◕</a:t>
-            </a:r>
-            <a:r>
-              <a:rPr lang="en-US" altLang="ja-JP" dirty="0" smtClean="0"/>
-              <a:t>_◕ </a:t>
-            </a:r>
-            <a:r>
-              <a:rPr lang="bo-CN" dirty="0" smtClean="0"/>
-              <a:t>༽</a:t>
-            </a:r>
-            <a:r>
-              <a:rPr lang="ja-JP" altLang="en-US" dirty="0" smtClean="0"/>
-              <a:t>つ </a:t>
+              <a:rPr lang="en-US" dirty="0" smtClean="0"/>
+              <a:t>which backup has the info we need</a:t>
+            </a:r>
+          </a:p>
+          <a:p>
+            <a:endParaRPr lang="en-US" dirty="0"/>
+          </a:p>
+          <a:p>
+            <a:r>
+              <a:rPr lang="en-US" dirty="0" smtClean="0"/>
+              <a:t>answer is to look at the </a:t>
             </a:r>
             <a:r>
               <a:rPr lang="en-US" i="1" dirty="0" smtClean="0"/>
-              <a:t>terminal way is best way</a:t>
-            </a:r>
-            <a:r>
-              <a:rPr lang="en-US" dirty="0" smtClean="0"/>
-              <a:t> </a:t>
-            </a:r>
-            <a:r>
-              <a:rPr lang="bo-CN" dirty="0" smtClean="0"/>
-              <a:t>༼ </a:t>
-            </a:r>
-            <a:r>
-              <a:rPr lang="ja-JP" altLang="en-US" dirty="0" smtClean="0"/>
-              <a:t>つ ◕</a:t>
-            </a:r>
-            <a:r>
-              <a:rPr lang="en-US" altLang="ja-JP" dirty="0" smtClean="0"/>
-              <a:t>_◕ </a:t>
-            </a:r>
-            <a:r>
-              <a:rPr lang="bo-CN" dirty="0" smtClean="0"/>
-              <a:t>༽</a:t>
-            </a:r>
-            <a:r>
-              <a:rPr lang="ja-JP" altLang="en-US" dirty="0" smtClean="0"/>
-              <a:t>つ</a:t>
-            </a:r>
-            <a:endParaRPr lang="en-US" dirty="0"/>
+              <a:t>metadata</a:t>
+            </a:r>
           </a:p>
         </p:txBody>
       </p:sp>
     </p:spTree>
     <p:extLst>
       <p:ext uri="{BB962C8B-B14F-4D97-AF65-F5344CB8AC3E}">
-        <p14:creationId xmlns:p14="http://schemas.microsoft.com/office/powerpoint/2010/main" val="3106424522"/>
+        <p14:creationId xmlns:p14="http://schemas.microsoft.com/office/powerpoint/2010/main" val="454249930"/>
       </p:ext>
     </p:extLst>
   </p:cSld>
@@ -12151,7 +12265,7 @@
           <a:p>
             <a:r>
               <a:rPr lang="en-US" dirty="0" smtClean="0"/>
-              <a:t>going back…</a:t>
+              <a:t>metadata</a:t>
             </a:r>
             <a:endParaRPr lang="en-US" dirty="0"/>
           </a:p>
@@ -12181,7 +12295,13 @@
           <a:p>
             <a:r>
               <a:rPr lang="en-US" dirty="0" smtClean="0"/>
-              <a:t>remember this?</a:t>
+              <a:t>a set of data that describes and gives information about other data</a:t>
+            </a:r>
+          </a:p>
+          <a:p>
+            <a:r>
+              <a:rPr lang="en-US" dirty="0" smtClean="0"/>
+              <a:t>backups should contain metadata</a:t>
             </a:r>
           </a:p>
         </p:txBody>
@@ -12189,7 +12309,7 @@
     </p:spTree>
     <p:extLst>
       <p:ext uri="{BB962C8B-B14F-4D97-AF65-F5344CB8AC3E}">
-        <p14:creationId xmlns:p14="http://schemas.microsoft.com/office/powerpoint/2010/main" val="3419472674"/>
+        <p14:creationId xmlns:p14="http://schemas.microsoft.com/office/powerpoint/2010/main" val="2410444332"/>
       </p:ext>
     </p:extLst>
   </p:cSld>
@@ -12252,7 +12372,7 @@
           <a:p>
             <a:r>
               <a:rPr lang="en-US" dirty="0" smtClean="0"/>
-              <a:t>new problem</a:t>
+              <a:t>metadata</a:t>
             </a:r>
             <a:endParaRPr lang="en-US" dirty="0"/>
           </a:p>
@@ -12282,41 +12402,27 @@
           <a:p>
             <a:r>
               <a:rPr lang="en-US" dirty="0" smtClean="0"/>
-              <a:t>which backup has the info we need</a:t>
-            </a:r>
-          </a:p>
-          <a:p>
-            <a:endParaRPr lang="en-US" dirty="0"/>
-          </a:p>
-          <a:p>
-            <a:r>
-              <a:rPr lang="en-US" dirty="0" smtClean="0"/>
-              <a:t>s5secretsgg		s5secretsgg_2015-09-01 		s5secretsgg_2015-09-10</a:t>
-            </a:r>
-          </a:p>
-          <a:p>
-            <a:r>
-              <a:rPr lang="en-US" dirty="0" smtClean="0"/>
-              <a:t>s5secretsgg_2015-09-19	</a:t>
-            </a:r>
-            <a:r>
-              <a:rPr lang="en-US" dirty="0"/>
-              <a:t> </a:t>
-            </a:r>
-            <a:r>
-              <a:rPr lang="en-US" dirty="0" smtClean="0"/>
-              <a:t>s5secretsgg_2015-09-28</a:t>
-            </a:r>
-          </a:p>
-          <a:p>
-            <a:endParaRPr lang="en-US" dirty="0" smtClean="0"/>
+              <a:t>who</a:t>
+            </a:r>
+          </a:p>
+          <a:p>
+            <a:r>
+              <a:rPr lang="en-US" dirty="0" smtClean="0"/>
+              <a:t>what</a:t>
+            </a:r>
+          </a:p>
+          <a:p>
+            <a:r>
+              <a:rPr lang="en-US" dirty="0" smtClean="0"/>
+              <a:t>when</a:t>
+            </a:r>
           </a:p>
         </p:txBody>
       </p:sp>
     </p:spTree>
     <p:extLst>
       <p:ext uri="{BB962C8B-B14F-4D97-AF65-F5344CB8AC3E}">
-        <p14:creationId xmlns:p14="http://schemas.microsoft.com/office/powerpoint/2010/main" val="665420287"/>
+        <p14:creationId xmlns:p14="http://schemas.microsoft.com/office/powerpoint/2010/main" val="1912402206"/>
       </p:ext>
     </p:extLst>
   </p:cSld>
@@ -12379,7 +12485,7 @@
           <a:p>
             <a:r>
               <a:rPr lang="en-US" dirty="0" smtClean="0"/>
-              <a:t>new problem</a:t>
+              <a:t>metadata</a:t>
             </a:r>
             <a:endParaRPr lang="en-US" dirty="0"/>
           </a:p>
@@ -12409,28 +12515,29 @@
           <a:p>
             <a:r>
               <a:rPr lang="en-US" dirty="0" smtClean="0"/>
-              <a:t>which backup has the info we need</a:t>
-            </a:r>
-          </a:p>
-          <a:p>
-            <a:endParaRPr lang="en-US" dirty="0"/>
-          </a:p>
-          <a:p>
-            <a:r>
-              <a:rPr lang="en-US" dirty="0" smtClean="0"/>
-              <a:t>answer is to look at the </a:t>
-            </a:r>
-            <a:r>
-              <a:rPr lang="en-US" i="1" dirty="0" smtClean="0"/>
-              <a:t>metadata</a:t>
-            </a:r>
+              <a:t>who: author of the change</a:t>
+            </a:r>
+          </a:p>
+          <a:p>
+            <a:r>
+              <a:rPr lang="en-US" dirty="0" smtClean="0"/>
+              <a:t>what: </a:t>
+            </a:r>
+            <a:endParaRPr lang="en-US" dirty="0" smtClean="0"/>
+          </a:p>
+          <a:p>
+            <a:r>
+              <a:rPr lang="en-US" dirty="0" smtClean="0"/>
+              <a:t>when:</a:t>
+            </a:r>
+            <a:endParaRPr lang="en-US" dirty="0" smtClean="0"/>
           </a:p>
         </p:txBody>
       </p:sp>
     </p:spTree>
     <p:extLst>
       <p:ext uri="{BB962C8B-B14F-4D97-AF65-F5344CB8AC3E}">
-        <p14:creationId xmlns:p14="http://schemas.microsoft.com/office/powerpoint/2010/main" val="454249930"/>
+        <p14:creationId xmlns:p14="http://schemas.microsoft.com/office/powerpoint/2010/main" val="2934688431"/>
       </p:ext>
     </p:extLst>
   </p:cSld>
@@ -12493,7 +12600,7 @@
           <a:p>
             <a:r>
               <a:rPr lang="en-US" dirty="0" smtClean="0"/>
-              <a:t>git internals</a:t>
+              <a:t>metadata</a:t>
             </a:r>
             <a:endParaRPr lang="en-US" dirty="0"/>
           </a:p>
@@ -12523,37 +12630,32 @@
           <a:p>
             <a:r>
               <a:rPr lang="en-US" dirty="0" smtClean="0"/>
-              <a:t>this section is </a:t>
-            </a:r>
-            <a:r>
-              <a:rPr lang="en-US" b="1" dirty="0" smtClean="0"/>
-              <a:t>very</a:t>
-            </a:r>
-            <a:r>
-              <a:rPr lang="en-US" dirty="0" smtClean="0"/>
-              <a:t> important to understand</a:t>
-            </a:r>
-          </a:p>
-          <a:p>
-            <a:r>
-              <a:rPr lang="en-US" dirty="0" smtClean="0"/>
-              <a:t>seriously</a:t>
-            </a:r>
-            <a:r>
-              <a:rPr lang="en-US" dirty="0"/>
-              <a:t> </a:t>
-            </a:r>
-            <a:r>
-              <a:rPr lang="en-US" dirty="0" smtClean="0"/>
-              <a:t>– pay attention to this section</a:t>
-            </a:r>
+              <a:t>who: author of the change</a:t>
+            </a:r>
+          </a:p>
+          <a:p>
+            <a:r>
+              <a:rPr lang="en-US" dirty="0" smtClean="0"/>
+              <a:t>what: what was changed</a:t>
+            </a:r>
+          </a:p>
+          <a:p>
+            <a:r>
+              <a:rPr lang="en-US" dirty="0" smtClean="0"/>
+              <a:t>when</a:t>
+            </a:r>
+            <a:r>
+              <a:rPr lang="en-US" dirty="0" smtClean="0"/>
+              <a:t>:</a:t>
+            </a:r>
+            <a:endParaRPr lang="en-US" dirty="0" smtClean="0"/>
           </a:p>
         </p:txBody>
       </p:sp>
     </p:spTree>
     <p:extLst>
       <p:ext uri="{BB962C8B-B14F-4D97-AF65-F5344CB8AC3E}">
-        <p14:creationId xmlns:p14="http://schemas.microsoft.com/office/powerpoint/2010/main" val="1639486604"/>
+        <p14:creationId xmlns:p14="http://schemas.microsoft.com/office/powerpoint/2010/main" val="2764503501"/>
       </p:ext>
     </p:extLst>
   </p:cSld>
@@ -12646,13 +12748,19 @@
           <a:p>
             <a:r>
               <a:rPr lang="en-US" dirty="0" smtClean="0"/>
-              <a:t>a set of data that describes and gives information about other data</a:t>
-            </a:r>
-          </a:p>
-          <a:p>
-            <a:r>
-              <a:rPr lang="en-US" dirty="0" smtClean="0"/>
-              <a:t>backups should contain metadata</a:t>
+              <a:t>who: author of the change</a:t>
+            </a:r>
+          </a:p>
+          <a:p>
+            <a:r>
+              <a:rPr lang="en-US" dirty="0" smtClean="0"/>
+              <a:t>what: what was changed</a:t>
+            </a:r>
+          </a:p>
+          <a:p>
+            <a:r>
+              <a:rPr lang="en-US" dirty="0" smtClean="0"/>
+              <a:t>when: date and time of change</a:t>
             </a:r>
           </a:p>
         </p:txBody>
@@ -12660,7 +12768,7 @@
     </p:spTree>
     <p:extLst>
       <p:ext uri="{BB962C8B-B14F-4D97-AF65-F5344CB8AC3E}">
-        <p14:creationId xmlns:p14="http://schemas.microsoft.com/office/powerpoint/2010/main" val="2410444332"/>
+        <p14:creationId xmlns:p14="http://schemas.microsoft.com/office/powerpoint/2010/main" val="1957654084"/>
       </p:ext>
     </p:extLst>
   </p:cSld>
@@ -12747,33 +12855,47 @@
         </p:spPr>
         <p:txBody>
           <a:bodyPr>
-            <a:normAutofit/>
+            <a:normAutofit lnSpcReduction="10000"/>
           </a:bodyPr>
           <a:lstStyle/>
           <a:p>
             <a:r>
               <a:rPr lang="en-US" dirty="0" smtClean="0"/>
-              <a:t>who</a:t>
-            </a:r>
-          </a:p>
-          <a:p>
-            <a:r>
-              <a:rPr lang="en-US" dirty="0" smtClean="0"/>
-              <a:t>what</a:t>
-            </a:r>
-          </a:p>
-          <a:p>
-            <a:r>
-              <a:rPr lang="en-US" dirty="0" smtClean="0"/>
-              <a:t>when</a:t>
-            </a:r>
+              <a:t>who: author of the change</a:t>
+            </a:r>
+          </a:p>
+          <a:p>
+            <a:r>
+              <a:rPr lang="en-US" dirty="0" smtClean="0"/>
+              <a:t>what: what was changed</a:t>
+            </a:r>
+          </a:p>
+          <a:p>
+            <a:r>
+              <a:rPr lang="en-US" dirty="0" smtClean="0"/>
+              <a:t>when: date and time of </a:t>
+            </a:r>
+            <a:r>
+              <a:rPr lang="en-US" dirty="0" smtClean="0"/>
+              <a:t>change</a:t>
+            </a:r>
+          </a:p>
+          <a:p>
+            <a:endParaRPr lang="en-US" dirty="0"/>
+          </a:p>
+          <a:p>
+            <a:r>
+              <a:rPr lang="en-US" dirty="0" smtClean="0"/>
+              <a:t>when used properly, git is a very powerful tool to manage your workflow</a:t>
+            </a:r>
+            <a:endParaRPr lang="en-US" dirty="0" smtClean="0"/>
           </a:p>
         </p:txBody>
       </p:sp>
     </p:spTree>
     <p:extLst>
       <p:ext uri="{BB962C8B-B14F-4D97-AF65-F5344CB8AC3E}">
-        <p14:creationId xmlns:p14="http://schemas.microsoft.com/office/powerpoint/2010/main" val="1912402206"/>
+        <p14:creationId xmlns:p14="http://schemas.microsoft.com/office/powerpoint/2010/main" val="3181697116"/>
       </p:ext>
     </p:extLst>
   </p:cSld>
@@ -12836,7 +12958,7 @@
           <a:p>
             <a:r>
               <a:rPr lang="en-US" dirty="0" smtClean="0"/>
-              <a:t>metadata</a:t>
+              <a:t>fin</a:t>
             </a:r>
             <a:endParaRPr lang="en-US" dirty="0"/>
           </a:p>
@@ -12844,7 +12966,7 @@
       </p:sp>
       <p:sp>
         <p:nvSpPr>
-          <p:cNvPr id="4" name="Text Placeholder 3"/>
+          <p:cNvPr id="3" name="Text Placeholder 2"/>
           <p:cNvSpPr>
             <a:spLocks noGrp="1"/>
           </p:cNvSpPr>
@@ -12852,38 +12974,13 @@
             <p:ph type="body" idx="1"/>
           </p:nvPr>
         </p:nvSpPr>
-        <p:spPr>
-          <a:xfrm>
-            <a:off x="1295401" y="3579488"/>
-            <a:ext cx="9590550" cy="2156294"/>
-          </a:xfrm>
-        </p:spPr>
+        <p:spPr/>
         <p:txBody>
           <a:bodyPr>
             <a:normAutofit/>
           </a:bodyPr>
           <a:lstStyle/>
           <a:p>
-            <a:r>
-              <a:rPr lang="en-US" dirty="0" smtClean="0"/>
-              <a:t>who: author of the change</a:t>
-            </a:r>
-          </a:p>
-          <a:p>
-            <a:r>
-              <a:rPr lang="en-US" dirty="0" smtClean="0"/>
-              <a:t>what: what was changed</a:t>
-            </a:r>
-          </a:p>
-          <a:p>
-            <a:r>
-              <a:rPr lang="en-US" dirty="0" smtClean="0"/>
-              <a:t>when: date and time of </a:t>
-            </a:r>
-            <a:r>
-              <a:rPr lang="en-US" dirty="0" smtClean="0"/>
-              <a:t>change</a:t>
-            </a:r>
             <a:endParaRPr lang="en-US" dirty="0" smtClean="0"/>
           </a:p>
         </p:txBody>
@@ -12891,7 +12988,7 @@
     </p:spTree>
     <p:extLst>
       <p:ext uri="{BB962C8B-B14F-4D97-AF65-F5344CB8AC3E}">
-        <p14:creationId xmlns:p14="http://schemas.microsoft.com/office/powerpoint/2010/main" val="1645288520"/>
+        <p14:creationId xmlns:p14="http://schemas.microsoft.com/office/powerpoint/2010/main" val="2924215978"/>
       </p:ext>
     </p:extLst>
   </p:cSld>
@@ -12973,49 +13070,13 @@
         <p:spPr/>
         <p:txBody>
           <a:bodyPr>
-            <a:normAutofit fontScale="70000" lnSpcReduction="20000"/>
+            <a:normAutofit/>
           </a:bodyPr>
           <a:lstStyle/>
           <a:p>
             <a:r>
               <a:rPr lang="en-US" dirty="0" smtClean="0"/>
-              <a:t>very </a:t>
-            </a:r>
-            <a:r>
-              <a:rPr lang="en-US" dirty="0" smtClean="0"/>
-              <a:t>this is so short</a:t>
-            </a:r>
-          </a:p>
-          <a:p>
-            <a:r>
-              <a:rPr lang="en-US" dirty="0" smtClean="0"/>
-              <a:t>the full presentation is over 400 slides…</a:t>
-            </a:r>
-          </a:p>
-          <a:p>
-            <a:r>
-              <a:rPr lang="en-US" dirty="0"/>
-              <a:t>i</a:t>
-            </a:r>
-            <a:r>
-              <a:rPr lang="en-US" dirty="0" smtClean="0"/>
-              <a:t>t is freely available on my GitHub profile: Nefari0uss</a:t>
-            </a:r>
-          </a:p>
-          <a:p>
-            <a:r>
-              <a:rPr lang="en-US" dirty="0"/>
-              <a:t>https://</a:t>
-            </a:r>
-            <a:r>
-              <a:rPr lang="en-US" dirty="0" smtClean="0"/>
-              <a:t>goo.gl/uyzCs9</a:t>
-            </a:r>
-          </a:p>
-          <a:p>
-            <a:r>
-              <a:rPr lang="en-US" dirty="0" smtClean="0"/>
-              <a:t>I hope you learned something!</a:t>
+              <a:t>thank you for listening</a:t>
             </a:r>
             <a:endParaRPr lang="en-US" dirty="0" smtClean="0"/>
           </a:p>
@@ -13024,7 +13085,7 @@
     </p:spTree>
     <p:extLst>
       <p:ext uri="{BB962C8B-B14F-4D97-AF65-F5344CB8AC3E}">
-        <p14:creationId xmlns:p14="http://schemas.microsoft.com/office/powerpoint/2010/main" val="852246083"/>
+        <p14:creationId xmlns:p14="http://schemas.microsoft.com/office/powerpoint/2010/main" val="2572165784"/>
       </p:ext>
     </p:extLst>
   </p:cSld>
@@ -13087,7 +13148,7 @@
           <a:p>
             <a:r>
               <a:rPr lang="en-US" dirty="0" smtClean="0"/>
-              <a:t>in case of fire</a:t>
+              <a:t>fin</a:t>
             </a:r>
             <a:endParaRPr lang="en-US" dirty="0"/>
           </a:p>
@@ -13105,41 +13166,29 @@
         </p:nvSpPr>
         <p:spPr/>
         <p:txBody>
-          <a:bodyPr/>
-          <a:lstStyle/>
-          <a:p>
-            <a:pPr marL="457200" indent="-457200">
-              <a:buAutoNum type="arabicPeriod"/>
-            </a:pPr>
-            <a:r>
-              <a:rPr lang="en-US" dirty="0" smtClean="0"/>
-              <a:t>git commit</a:t>
-            </a:r>
-          </a:p>
-          <a:p>
-            <a:pPr marL="457200" indent="-457200">
-              <a:buAutoNum type="arabicPeriod"/>
-            </a:pPr>
-            <a:r>
-              <a:rPr lang="en-US" dirty="0" smtClean="0"/>
-              <a:t>git push</a:t>
-            </a:r>
-          </a:p>
-          <a:p>
-            <a:pPr marL="457200" indent="-457200">
-              <a:buAutoNum type="arabicPeriod"/>
-            </a:pPr>
-            <a:r>
-              <a:rPr lang="en-US" dirty="0" smtClean="0"/>
-              <a:t>leave building</a:t>
-            </a:r>
+          <a:bodyPr>
+            <a:normAutofit/>
+          </a:bodyPr>
+          <a:lstStyle/>
+          <a:p>
+            <a:r>
+              <a:rPr lang="en-US" dirty="0" smtClean="0"/>
+              <a:t>thank you for listening</a:t>
+            </a:r>
+          </a:p>
+          <a:p>
+            <a:r>
+              <a:rPr lang="en-US" dirty="0" smtClean="0"/>
+              <a:t>sorry this presentation is so short</a:t>
+            </a:r>
+            <a:endParaRPr lang="en-US" dirty="0" smtClean="0"/>
           </a:p>
         </p:txBody>
       </p:sp>
     </p:spTree>
     <p:extLst>
       <p:ext uri="{BB962C8B-B14F-4D97-AF65-F5344CB8AC3E}">
-        <p14:creationId xmlns:p14="http://schemas.microsoft.com/office/powerpoint/2010/main" val="2025279980"/>
+        <p14:creationId xmlns:p14="http://schemas.microsoft.com/office/powerpoint/2010/main" val="4005366321"/>
       </p:ext>
     </p:extLst>
   </p:cSld>
@@ -13201,67 +13250,52 @@
           <a:lstStyle/>
           <a:p>
             <a:r>
+              <a:rPr lang="en-US" dirty="0" smtClean="0"/>
+              <a:t>let's </a:t>
+            </a:r>
+            <a:r>
+              <a:rPr lang="en-US" dirty="0" smtClean="0"/>
+              <a:t>talk workflow</a:t>
+            </a:r>
+            <a:endParaRPr lang="en-US" dirty="0"/>
+          </a:p>
+        </p:txBody>
+      </p:sp>
+      <p:sp>
+        <p:nvSpPr>
+          <p:cNvPr id="4" name="Content Placeholder 3"/>
+          <p:cNvSpPr>
+            <a:spLocks noGrp="1"/>
+          </p:cNvSpPr>
+          <p:nvPr>
+            <p:ph type="body" idx="1"/>
+          </p:nvPr>
+        </p:nvSpPr>
+        <p:spPr/>
+        <p:txBody>
+          <a:bodyPr/>
+          <a:lstStyle/>
+          <a:p>
+            <a:r>
               <a:rPr lang="en-US" dirty="0"/>
-              <a:t>w</a:t>
-            </a:r>
-            <a:r>
-              <a:rPr lang="en-US" dirty="0" smtClean="0"/>
-              <a:t>hat is git</a:t>
-            </a:r>
-            <a:endParaRPr lang="en-US" dirty="0"/>
-          </a:p>
-        </p:txBody>
-      </p:sp>
-      <p:sp>
-        <p:nvSpPr>
-          <p:cNvPr id="5" name="Text Placeholder 4"/>
-          <p:cNvSpPr>
-            <a:spLocks noGrp="1"/>
-          </p:cNvSpPr>
-          <p:nvPr>
-            <p:ph type="body" idx="1"/>
-          </p:nvPr>
-        </p:nvSpPr>
-        <p:spPr/>
-        <p:txBody>
-          <a:bodyPr>
-            <a:normAutofit fontScale="92500" lnSpcReduction="20000"/>
-          </a:bodyPr>
-          <a:lstStyle/>
-          <a:p>
-            <a:r>
-              <a:rPr lang="en-US" dirty="0" smtClean="0"/>
-              <a:t>…</a:t>
-            </a:r>
-          </a:p>
-          <a:p>
-            <a:r>
-              <a:rPr lang="en-US" dirty="0"/>
-              <a:t>t</a:t>
-            </a:r>
-            <a:r>
-              <a:rPr lang="en-US" dirty="0" smtClean="0"/>
-              <a:t>ry this:</a:t>
-            </a:r>
-          </a:p>
-          <a:p>
-            <a:r>
-              <a:rPr lang="en-US" dirty="0" smtClean="0"/>
-              <a:t>a version control system that allows a user to</a:t>
-            </a:r>
-          </a:p>
-          <a:p>
-            <a:r>
-              <a:rPr lang="en-US" dirty="0" smtClean="0"/>
-              <a:t>store, update, and maintain files and projects.</a:t>
-            </a:r>
+              <a:t>i</a:t>
+            </a:r>
+            <a:r>
+              <a:rPr lang="en-US" dirty="0" smtClean="0"/>
+              <a:t>magine writing an </a:t>
+            </a:r>
+            <a:r>
+              <a:rPr lang="en-US" dirty="0" smtClean="0"/>
+              <a:t>essay</a:t>
+            </a:r>
+            <a:endParaRPr lang="en-US" dirty="0" smtClean="0"/>
           </a:p>
         </p:txBody>
       </p:sp>
     </p:spTree>
     <p:extLst>
       <p:ext uri="{BB962C8B-B14F-4D97-AF65-F5344CB8AC3E}">
-        <p14:creationId xmlns:p14="http://schemas.microsoft.com/office/powerpoint/2010/main" val="2421355235"/>
+        <p14:creationId xmlns:p14="http://schemas.microsoft.com/office/powerpoint/2010/main" val="196160112"/>
       </p:ext>
     </p:extLst>
   </p:cSld>
@@ -13291,6 +13325,883 @@
 </file>
 
 <file path=ppt/slides/slide60.xml><?xml version="1.0" encoding="utf-8"?>
+<p:sld xmlns:a="http://schemas.openxmlformats.org/drawingml/2006/main" xmlns:r="http://schemas.openxmlformats.org/officeDocument/2006/relationships" xmlns:p="http://schemas.openxmlformats.org/presentationml/2006/main">
+  <p:cSld>
+    <p:spTree>
+      <p:nvGrpSpPr>
+        <p:cNvPr id="1" name=""/>
+        <p:cNvGrpSpPr/>
+        <p:nvPr/>
+      </p:nvGrpSpPr>
+      <p:grpSpPr>
+        <a:xfrm>
+          <a:off x="0" y="0"/>
+          <a:ext cx="0" cy="0"/>
+          <a:chOff x="0" y="0"/>
+          <a:chExt cx="0" cy="0"/>
+        </a:xfrm>
+      </p:grpSpPr>
+      <p:sp>
+        <p:nvSpPr>
+          <p:cNvPr id="2" name="Title 1"/>
+          <p:cNvSpPr>
+            <a:spLocks noGrp="1"/>
+          </p:cNvSpPr>
+          <p:nvPr>
+            <p:ph type="title"/>
+          </p:nvPr>
+        </p:nvSpPr>
+        <p:spPr/>
+        <p:txBody>
+          <a:bodyPr/>
+          <a:lstStyle/>
+          <a:p>
+            <a:r>
+              <a:rPr lang="en-US" dirty="0" smtClean="0"/>
+              <a:t>fin</a:t>
+            </a:r>
+            <a:endParaRPr lang="en-US" dirty="0"/>
+          </a:p>
+        </p:txBody>
+      </p:sp>
+      <p:sp>
+        <p:nvSpPr>
+          <p:cNvPr id="3" name="Text Placeholder 2"/>
+          <p:cNvSpPr>
+            <a:spLocks noGrp="1"/>
+          </p:cNvSpPr>
+          <p:nvPr>
+            <p:ph type="body" idx="1"/>
+          </p:nvPr>
+        </p:nvSpPr>
+        <p:spPr/>
+        <p:txBody>
+          <a:bodyPr>
+            <a:normAutofit/>
+          </a:bodyPr>
+          <a:lstStyle/>
+          <a:p>
+            <a:r>
+              <a:rPr lang="en-US" dirty="0" smtClean="0"/>
+              <a:t>thank you for listening</a:t>
+            </a:r>
+          </a:p>
+          <a:p>
+            <a:r>
+              <a:rPr lang="en-US" dirty="0" smtClean="0"/>
+              <a:t>sorry this presentation is so short</a:t>
+            </a:r>
+          </a:p>
+          <a:p>
+            <a:r>
+              <a:rPr lang="en-US" dirty="0" smtClean="0"/>
+              <a:t>the complete version is far more comprehensive</a:t>
+            </a:r>
+          </a:p>
+          <a:p>
+            <a:endParaRPr lang="en-US" dirty="0" smtClean="0"/>
+          </a:p>
+          <a:p>
+            <a:endParaRPr lang="en-US" dirty="0" smtClean="0"/>
+          </a:p>
+        </p:txBody>
+      </p:sp>
+    </p:spTree>
+    <p:extLst>
+      <p:ext uri="{BB962C8B-B14F-4D97-AF65-F5344CB8AC3E}">
+        <p14:creationId xmlns:p14="http://schemas.microsoft.com/office/powerpoint/2010/main" val="679163729"/>
+      </p:ext>
+    </p:extLst>
+  </p:cSld>
+  <p:clrMapOvr>
+    <a:masterClrMapping/>
+  </p:clrMapOvr>
+  <mc:AlternateContent xmlns:mc="http://schemas.openxmlformats.org/markup-compatibility/2006" xmlns:p14="http://schemas.microsoft.com/office/powerpoint/2010/main">
+    <mc:Choice Requires="p14">
+      <p:transition p14:dur="100">
+        <p:cut/>
+      </p:transition>
+    </mc:Choice>
+    <mc:Fallback xmlns="">
+      <p:transition>
+        <p:cut/>
+      </p:transition>
+    </mc:Fallback>
+  </mc:AlternateContent>
+  <p:timing>
+    <p:tnLst>
+      <p:par>
+        <p:cTn id="1" dur="indefinite" restart="never" nodeType="tmRoot"/>
+      </p:par>
+    </p:tnLst>
+  </p:timing>
+</p:sld>
+</file>
+
+<file path=ppt/slides/slide61.xml><?xml version="1.0" encoding="utf-8"?>
+<p:sld xmlns:a="http://schemas.openxmlformats.org/drawingml/2006/main" xmlns:r="http://schemas.openxmlformats.org/officeDocument/2006/relationships" xmlns:p="http://schemas.openxmlformats.org/presentationml/2006/main">
+  <p:cSld>
+    <p:spTree>
+      <p:nvGrpSpPr>
+        <p:cNvPr id="1" name=""/>
+        <p:cNvGrpSpPr/>
+        <p:nvPr/>
+      </p:nvGrpSpPr>
+      <p:grpSpPr>
+        <a:xfrm>
+          <a:off x="0" y="0"/>
+          <a:ext cx="0" cy="0"/>
+          <a:chOff x="0" y="0"/>
+          <a:chExt cx="0" cy="0"/>
+        </a:xfrm>
+      </p:grpSpPr>
+      <p:sp>
+        <p:nvSpPr>
+          <p:cNvPr id="2" name="Title 1"/>
+          <p:cNvSpPr>
+            <a:spLocks noGrp="1"/>
+          </p:cNvSpPr>
+          <p:nvPr>
+            <p:ph type="title"/>
+          </p:nvPr>
+        </p:nvSpPr>
+        <p:spPr/>
+        <p:txBody>
+          <a:bodyPr/>
+          <a:lstStyle/>
+          <a:p>
+            <a:r>
+              <a:rPr lang="en-US" dirty="0" smtClean="0"/>
+              <a:t>fin</a:t>
+            </a:r>
+            <a:endParaRPr lang="en-US" dirty="0"/>
+          </a:p>
+        </p:txBody>
+      </p:sp>
+      <p:sp>
+        <p:nvSpPr>
+          <p:cNvPr id="3" name="Text Placeholder 2"/>
+          <p:cNvSpPr>
+            <a:spLocks noGrp="1"/>
+          </p:cNvSpPr>
+          <p:nvPr>
+            <p:ph type="body" idx="1"/>
+          </p:nvPr>
+        </p:nvSpPr>
+        <p:spPr/>
+        <p:txBody>
+          <a:bodyPr>
+            <a:normAutofit fontScale="92500" lnSpcReduction="20000"/>
+          </a:bodyPr>
+          <a:lstStyle/>
+          <a:p>
+            <a:r>
+              <a:rPr lang="en-US" dirty="0" smtClean="0"/>
+              <a:t>thank you for listening</a:t>
+            </a:r>
+          </a:p>
+          <a:p>
+            <a:r>
+              <a:rPr lang="en-US" dirty="0" smtClean="0"/>
+              <a:t>sorry this presentation is so short</a:t>
+            </a:r>
+          </a:p>
+          <a:p>
+            <a:r>
+              <a:rPr lang="en-US" dirty="0" smtClean="0"/>
+              <a:t>the complete version is far more comprehensive</a:t>
+            </a:r>
+          </a:p>
+          <a:p>
+            <a:r>
+              <a:rPr lang="en-US" dirty="0"/>
+              <a:t>it is freely available for anyone to view, edit, or </a:t>
+            </a:r>
+            <a:r>
+              <a:rPr lang="en-US" dirty="0" smtClean="0"/>
+              <a:t>reproduce on GitHub</a:t>
+            </a:r>
+            <a:endParaRPr lang="en-US" dirty="0"/>
+          </a:p>
+          <a:p>
+            <a:endParaRPr lang="en-US" dirty="0" smtClean="0"/>
+          </a:p>
+          <a:p>
+            <a:endParaRPr lang="en-US" dirty="0" smtClean="0"/>
+          </a:p>
+        </p:txBody>
+      </p:sp>
+    </p:spTree>
+    <p:extLst>
+      <p:ext uri="{BB962C8B-B14F-4D97-AF65-F5344CB8AC3E}">
+        <p14:creationId xmlns:p14="http://schemas.microsoft.com/office/powerpoint/2010/main" val="571458576"/>
+      </p:ext>
+    </p:extLst>
+  </p:cSld>
+  <p:clrMapOvr>
+    <a:masterClrMapping/>
+  </p:clrMapOvr>
+  <mc:AlternateContent xmlns:mc="http://schemas.openxmlformats.org/markup-compatibility/2006" xmlns:p14="http://schemas.microsoft.com/office/powerpoint/2010/main">
+    <mc:Choice Requires="p14">
+      <p:transition p14:dur="100">
+        <p:cut/>
+      </p:transition>
+    </mc:Choice>
+    <mc:Fallback xmlns="">
+      <p:transition>
+        <p:cut/>
+      </p:transition>
+    </mc:Fallback>
+  </mc:AlternateContent>
+  <p:timing>
+    <p:tnLst>
+      <p:par>
+        <p:cTn id="1" dur="indefinite" restart="never" nodeType="tmRoot"/>
+      </p:par>
+    </p:tnLst>
+  </p:timing>
+</p:sld>
+</file>
+
+<file path=ppt/slides/slide62.xml><?xml version="1.0" encoding="utf-8"?>
+<p:sld xmlns:a="http://schemas.openxmlformats.org/drawingml/2006/main" xmlns:r="http://schemas.openxmlformats.org/officeDocument/2006/relationships" xmlns:p="http://schemas.openxmlformats.org/presentationml/2006/main">
+  <p:cSld>
+    <p:spTree>
+      <p:nvGrpSpPr>
+        <p:cNvPr id="1" name=""/>
+        <p:cNvGrpSpPr/>
+        <p:nvPr/>
+      </p:nvGrpSpPr>
+      <p:grpSpPr>
+        <a:xfrm>
+          <a:off x="0" y="0"/>
+          <a:ext cx="0" cy="0"/>
+          <a:chOff x="0" y="0"/>
+          <a:chExt cx="0" cy="0"/>
+        </a:xfrm>
+      </p:grpSpPr>
+      <p:sp>
+        <p:nvSpPr>
+          <p:cNvPr id="2" name="Title 1"/>
+          <p:cNvSpPr>
+            <a:spLocks noGrp="1"/>
+          </p:cNvSpPr>
+          <p:nvPr>
+            <p:ph type="title"/>
+          </p:nvPr>
+        </p:nvSpPr>
+        <p:spPr/>
+        <p:txBody>
+          <a:bodyPr/>
+          <a:lstStyle/>
+          <a:p>
+            <a:r>
+              <a:rPr lang="en-US" dirty="0" smtClean="0"/>
+              <a:t>fin</a:t>
+            </a:r>
+            <a:endParaRPr lang="en-US" dirty="0"/>
+          </a:p>
+        </p:txBody>
+      </p:sp>
+      <p:sp>
+        <p:nvSpPr>
+          <p:cNvPr id="3" name="Text Placeholder 2"/>
+          <p:cNvSpPr>
+            <a:spLocks noGrp="1"/>
+          </p:cNvSpPr>
+          <p:nvPr>
+            <p:ph type="body" idx="1"/>
+          </p:nvPr>
+        </p:nvSpPr>
+        <p:spPr/>
+        <p:txBody>
+          <a:bodyPr>
+            <a:normAutofit/>
+          </a:bodyPr>
+          <a:lstStyle/>
+          <a:p>
+            <a:r>
+              <a:rPr lang="en-US" dirty="0" smtClean="0"/>
+              <a:t>GitHub </a:t>
+            </a:r>
+            <a:r>
+              <a:rPr lang="en-US" dirty="0"/>
+              <a:t>profile: </a:t>
+            </a:r>
+            <a:r>
+              <a:rPr lang="en-US" dirty="0" smtClean="0"/>
+              <a:t>Nefari0uss</a:t>
+            </a:r>
+            <a:endParaRPr lang="en-US" dirty="0" smtClean="0"/>
+          </a:p>
+        </p:txBody>
+      </p:sp>
+    </p:spTree>
+    <p:extLst>
+      <p:ext uri="{BB962C8B-B14F-4D97-AF65-F5344CB8AC3E}">
+        <p14:creationId xmlns:p14="http://schemas.microsoft.com/office/powerpoint/2010/main" val="577088116"/>
+      </p:ext>
+    </p:extLst>
+  </p:cSld>
+  <p:clrMapOvr>
+    <a:masterClrMapping/>
+  </p:clrMapOvr>
+  <mc:AlternateContent xmlns:mc="http://schemas.openxmlformats.org/markup-compatibility/2006" xmlns:p14="http://schemas.microsoft.com/office/powerpoint/2010/main">
+    <mc:Choice Requires="p14">
+      <p:transition p14:dur="100">
+        <p:cut/>
+      </p:transition>
+    </mc:Choice>
+    <mc:Fallback xmlns="">
+      <p:transition>
+        <p:cut/>
+      </p:transition>
+    </mc:Fallback>
+  </mc:AlternateContent>
+  <p:timing>
+    <p:tnLst>
+      <p:par>
+        <p:cTn id="1" dur="indefinite" restart="never" nodeType="tmRoot"/>
+      </p:par>
+    </p:tnLst>
+  </p:timing>
+</p:sld>
+</file>
+
+<file path=ppt/slides/slide63.xml><?xml version="1.0" encoding="utf-8"?>
+<p:sld xmlns:a="http://schemas.openxmlformats.org/drawingml/2006/main" xmlns:r="http://schemas.openxmlformats.org/officeDocument/2006/relationships" xmlns:p="http://schemas.openxmlformats.org/presentationml/2006/main">
+  <p:cSld>
+    <p:spTree>
+      <p:nvGrpSpPr>
+        <p:cNvPr id="1" name=""/>
+        <p:cNvGrpSpPr/>
+        <p:nvPr/>
+      </p:nvGrpSpPr>
+      <p:grpSpPr>
+        <a:xfrm>
+          <a:off x="0" y="0"/>
+          <a:ext cx="0" cy="0"/>
+          <a:chOff x="0" y="0"/>
+          <a:chExt cx="0" cy="0"/>
+        </a:xfrm>
+      </p:grpSpPr>
+      <p:sp>
+        <p:nvSpPr>
+          <p:cNvPr id="2" name="Title 1"/>
+          <p:cNvSpPr>
+            <a:spLocks noGrp="1"/>
+          </p:cNvSpPr>
+          <p:nvPr>
+            <p:ph type="title"/>
+          </p:nvPr>
+        </p:nvSpPr>
+        <p:spPr/>
+        <p:txBody>
+          <a:bodyPr/>
+          <a:lstStyle/>
+          <a:p>
+            <a:r>
+              <a:rPr lang="en-US" dirty="0" smtClean="0"/>
+              <a:t>fin</a:t>
+            </a:r>
+            <a:endParaRPr lang="en-US" dirty="0"/>
+          </a:p>
+        </p:txBody>
+      </p:sp>
+      <p:sp>
+        <p:nvSpPr>
+          <p:cNvPr id="3" name="Text Placeholder 2"/>
+          <p:cNvSpPr>
+            <a:spLocks noGrp="1"/>
+          </p:cNvSpPr>
+          <p:nvPr>
+            <p:ph type="body" idx="1"/>
+          </p:nvPr>
+        </p:nvSpPr>
+        <p:spPr/>
+        <p:txBody>
+          <a:bodyPr>
+            <a:normAutofit/>
+          </a:bodyPr>
+          <a:lstStyle/>
+          <a:p>
+            <a:r>
+              <a:rPr lang="en-US" dirty="0" smtClean="0"/>
+              <a:t>GitHub </a:t>
+            </a:r>
+            <a:r>
+              <a:rPr lang="en-US" dirty="0"/>
+              <a:t>profile: </a:t>
+            </a:r>
+            <a:r>
+              <a:rPr lang="en-US" dirty="0" smtClean="0"/>
+              <a:t>Nefari0uss</a:t>
+            </a:r>
+            <a:endParaRPr lang="en-US" dirty="0" smtClean="0"/>
+          </a:p>
+          <a:p>
+            <a:r>
+              <a:rPr lang="en-US" dirty="0" smtClean="0"/>
+              <a:t>look under presentations </a:t>
+            </a:r>
+            <a:r>
+              <a:rPr lang="en-US" dirty="0" smtClean="0">
+                <a:sym typeface="Wingdings" panose="05000000000000000000" pitchFamily="2" charset="2"/>
+              </a:rPr>
+              <a:t> git </a:t>
+            </a:r>
+          </a:p>
+        </p:txBody>
+      </p:sp>
+    </p:spTree>
+    <p:extLst>
+      <p:ext uri="{BB962C8B-B14F-4D97-AF65-F5344CB8AC3E}">
+        <p14:creationId xmlns:p14="http://schemas.microsoft.com/office/powerpoint/2010/main" val="4047283763"/>
+      </p:ext>
+    </p:extLst>
+  </p:cSld>
+  <p:clrMapOvr>
+    <a:masterClrMapping/>
+  </p:clrMapOvr>
+  <mc:AlternateContent xmlns:mc="http://schemas.openxmlformats.org/markup-compatibility/2006" xmlns:p14="http://schemas.microsoft.com/office/powerpoint/2010/main">
+    <mc:Choice Requires="p14">
+      <p:transition p14:dur="100">
+        <p:cut/>
+      </p:transition>
+    </mc:Choice>
+    <mc:Fallback xmlns="">
+      <p:transition>
+        <p:cut/>
+      </p:transition>
+    </mc:Fallback>
+  </mc:AlternateContent>
+  <p:timing>
+    <p:tnLst>
+      <p:par>
+        <p:cTn id="1" dur="indefinite" restart="never" nodeType="tmRoot"/>
+      </p:par>
+    </p:tnLst>
+  </p:timing>
+</p:sld>
+</file>
+
+<file path=ppt/slides/slide64.xml><?xml version="1.0" encoding="utf-8"?>
+<p:sld xmlns:a="http://schemas.openxmlformats.org/drawingml/2006/main" xmlns:r="http://schemas.openxmlformats.org/officeDocument/2006/relationships" xmlns:p="http://schemas.openxmlformats.org/presentationml/2006/main">
+  <p:cSld>
+    <p:spTree>
+      <p:nvGrpSpPr>
+        <p:cNvPr id="1" name=""/>
+        <p:cNvGrpSpPr/>
+        <p:nvPr/>
+      </p:nvGrpSpPr>
+      <p:grpSpPr>
+        <a:xfrm>
+          <a:off x="0" y="0"/>
+          <a:ext cx="0" cy="0"/>
+          <a:chOff x="0" y="0"/>
+          <a:chExt cx="0" cy="0"/>
+        </a:xfrm>
+      </p:grpSpPr>
+      <p:sp>
+        <p:nvSpPr>
+          <p:cNvPr id="2" name="Title 1"/>
+          <p:cNvSpPr>
+            <a:spLocks noGrp="1"/>
+          </p:cNvSpPr>
+          <p:nvPr>
+            <p:ph type="title"/>
+          </p:nvPr>
+        </p:nvSpPr>
+        <p:spPr/>
+        <p:txBody>
+          <a:bodyPr/>
+          <a:lstStyle/>
+          <a:p>
+            <a:r>
+              <a:rPr lang="en-US" dirty="0" smtClean="0"/>
+              <a:t>fin</a:t>
+            </a:r>
+            <a:endParaRPr lang="en-US" dirty="0"/>
+          </a:p>
+        </p:txBody>
+      </p:sp>
+      <p:sp>
+        <p:nvSpPr>
+          <p:cNvPr id="3" name="Text Placeholder 2"/>
+          <p:cNvSpPr>
+            <a:spLocks noGrp="1"/>
+          </p:cNvSpPr>
+          <p:nvPr>
+            <p:ph type="body" idx="1"/>
+          </p:nvPr>
+        </p:nvSpPr>
+        <p:spPr/>
+        <p:txBody>
+          <a:bodyPr>
+            <a:normAutofit/>
+          </a:bodyPr>
+          <a:lstStyle/>
+          <a:p>
+            <a:r>
+              <a:rPr lang="en-US" dirty="0" smtClean="0"/>
+              <a:t>GitHub </a:t>
+            </a:r>
+            <a:r>
+              <a:rPr lang="en-US" dirty="0"/>
+              <a:t>profile: </a:t>
+            </a:r>
+            <a:r>
+              <a:rPr lang="en-US" dirty="0" smtClean="0"/>
+              <a:t>Nefari0uss</a:t>
+            </a:r>
+            <a:endParaRPr lang="en-US" dirty="0" smtClean="0"/>
+          </a:p>
+          <a:p>
+            <a:r>
+              <a:rPr lang="en-US" dirty="0" smtClean="0"/>
+              <a:t>look under presentations </a:t>
+            </a:r>
+            <a:r>
+              <a:rPr lang="en-US" dirty="0" smtClean="0">
+                <a:sym typeface="Wingdings" panose="05000000000000000000" pitchFamily="2" charset="2"/>
+              </a:rPr>
+              <a:t> git </a:t>
+            </a:r>
+          </a:p>
+          <a:p>
+            <a:r>
+              <a:rPr lang="en-US" dirty="0" smtClean="0"/>
+              <a:t>https</a:t>
+            </a:r>
+            <a:r>
+              <a:rPr lang="en-US" dirty="0"/>
+              <a:t>://</a:t>
+            </a:r>
+            <a:r>
+              <a:rPr lang="en-US" dirty="0" smtClean="0"/>
+              <a:t>goo.gl/uyzCs9</a:t>
+            </a:r>
+            <a:endParaRPr lang="en-US" dirty="0" smtClean="0"/>
+          </a:p>
+        </p:txBody>
+      </p:sp>
+    </p:spTree>
+    <p:extLst>
+      <p:ext uri="{BB962C8B-B14F-4D97-AF65-F5344CB8AC3E}">
+        <p14:creationId xmlns:p14="http://schemas.microsoft.com/office/powerpoint/2010/main" val="2900777115"/>
+      </p:ext>
+    </p:extLst>
+  </p:cSld>
+  <p:clrMapOvr>
+    <a:masterClrMapping/>
+  </p:clrMapOvr>
+  <mc:AlternateContent xmlns:mc="http://schemas.openxmlformats.org/markup-compatibility/2006" xmlns:p14="http://schemas.microsoft.com/office/powerpoint/2010/main">
+    <mc:Choice Requires="p14">
+      <p:transition p14:dur="100">
+        <p:cut/>
+      </p:transition>
+    </mc:Choice>
+    <mc:Fallback xmlns="">
+      <p:transition>
+        <p:cut/>
+      </p:transition>
+    </mc:Fallback>
+  </mc:AlternateContent>
+  <p:timing>
+    <p:tnLst>
+      <p:par>
+        <p:cTn id="1" dur="indefinite" restart="never" nodeType="tmRoot"/>
+      </p:par>
+    </p:tnLst>
+  </p:timing>
+</p:sld>
+</file>
+
+<file path=ppt/slides/slide65.xml><?xml version="1.0" encoding="utf-8"?>
+<p:sld xmlns:a="http://schemas.openxmlformats.org/drawingml/2006/main" xmlns:r="http://schemas.openxmlformats.org/officeDocument/2006/relationships" xmlns:p="http://schemas.openxmlformats.org/presentationml/2006/main">
+  <p:cSld>
+    <p:spTree>
+      <p:nvGrpSpPr>
+        <p:cNvPr id="1" name=""/>
+        <p:cNvGrpSpPr/>
+        <p:nvPr/>
+      </p:nvGrpSpPr>
+      <p:grpSpPr>
+        <a:xfrm>
+          <a:off x="0" y="0"/>
+          <a:ext cx="0" cy="0"/>
+          <a:chOff x="0" y="0"/>
+          <a:chExt cx="0" cy="0"/>
+        </a:xfrm>
+      </p:grpSpPr>
+      <p:sp>
+        <p:nvSpPr>
+          <p:cNvPr id="2" name="Title 1"/>
+          <p:cNvSpPr>
+            <a:spLocks noGrp="1"/>
+          </p:cNvSpPr>
+          <p:nvPr>
+            <p:ph type="title"/>
+          </p:nvPr>
+        </p:nvSpPr>
+        <p:spPr/>
+        <p:txBody>
+          <a:bodyPr/>
+          <a:lstStyle/>
+          <a:p>
+            <a:r>
+              <a:rPr lang="en-US" dirty="0" smtClean="0"/>
+              <a:t>fin</a:t>
+            </a:r>
+            <a:endParaRPr lang="en-US" dirty="0"/>
+          </a:p>
+        </p:txBody>
+      </p:sp>
+      <p:sp>
+        <p:nvSpPr>
+          <p:cNvPr id="3" name="Text Placeholder 2"/>
+          <p:cNvSpPr>
+            <a:spLocks noGrp="1"/>
+          </p:cNvSpPr>
+          <p:nvPr>
+            <p:ph type="body" idx="1"/>
+          </p:nvPr>
+        </p:nvSpPr>
+        <p:spPr/>
+        <p:txBody>
+          <a:bodyPr>
+            <a:normAutofit fontScale="92500" lnSpcReduction="20000"/>
+          </a:bodyPr>
+          <a:lstStyle/>
+          <a:p>
+            <a:r>
+              <a:rPr lang="en-US" dirty="0" smtClean="0"/>
+              <a:t>GitHub </a:t>
+            </a:r>
+            <a:r>
+              <a:rPr lang="en-US" dirty="0"/>
+              <a:t>profile: </a:t>
+            </a:r>
+            <a:r>
+              <a:rPr lang="en-US" dirty="0" smtClean="0"/>
+              <a:t>Nefari0uss</a:t>
+            </a:r>
+            <a:endParaRPr lang="en-US" dirty="0" smtClean="0"/>
+          </a:p>
+          <a:p>
+            <a:r>
+              <a:rPr lang="en-US" dirty="0" smtClean="0"/>
+              <a:t>look under presentations </a:t>
+            </a:r>
+            <a:r>
+              <a:rPr lang="en-US" dirty="0" smtClean="0">
+                <a:sym typeface="Wingdings" panose="05000000000000000000" pitchFamily="2" charset="2"/>
+              </a:rPr>
+              <a:t> git </a:t>
+            </a:r>
+          </a:p>
+          <a:p>
+            <a:r>
+              <a:rPr lang="en-US" dirty="0" smtClean="0"/>
+              <a:t>https</a:t>
+            </a:r>
+            <a:r>
+              <a:rPr lang="en-US" dirty="0"/>
+              <a:t>://</a:t>
+            </a:r>
+            <a:r>
+              <a:rPr lang="en-US" dirty="0" smtClean="0"/>
+              <a:t>goo.gl/uyzCs9</a:t>
+            </a:r>
+          </a:p>
+          <a:p>
+            <a:r>
+              <a:rPr lang="en-US" dirty="0"/>
+              <a:t>i</a:t>
+            </a:r>
+            <a:r>
+              <a:rPr lang="en-US" dirty="0" smtClean="0"/>
+              <a:t> </a:t>
+            </a:r>
+            <a:r>
+              <a:rPr lang="en-US" dirty="0" smtClean="0"/>
+              <a:t>hope you learned something!</a:t>
+            </a:r>
+          </a:p>
+        </p:txBody>
+      </p:sp>
+    </p:spTree>
+    <p:extLst>
+      <p:ext uri="{BB962C8B-B14F-4D97-AF65-F5344CB8AC3E}">
+        <p14:creationId xmlns:p14="http://schemas.microsoft.com/office/powerpoint/2010/main" val="1342459823"/>
+      </p:ext>
+    </p:extLst>
+  </p:cSld>
+  <p:clrMapOvr>
+    <a:masterClrMapping/>
+  </p:clrMapOvr>
+  <mc:AlternateContent xmlns:mc="http://schemas.openxmlformats.org/markup-compatibility/2006" xmlns:p14="http://schemas.microsoft.com/office/powerpoint/2010/main">
+    <mc:Choice Requires="p14">
+      <p:transition p14:dur="100">
+        <p:cut/>
+      </p:transition>
+    </mc:Choice>
+    <mc:Fallback xmlns="">
+      <p:transition>
+        <p:cut/>
+      </p:transition>
+    </mc:Fallback>
+  </mc:AlternateContent>
+  <p:timing>
+    <p:tnLst>
+      <p:par>
+        <p:cTn id="1" dur="indefinite" restart="never" nodeType="tmRoot"/>
+      </p:par>
+    </p:tnLst>
+  </p:timing>
+</p:sld>
+</file>
+
+<file path=ppt/slides/slide66.xml><?xml version="1.0" encoding="utf-8"?>
+<p:sld xmlns:a="http://schemas.openxmlformats.org/drawingml/2006/main" xmlns:r="http://schemas.openxmlformats.org/officeDocument/2006/relationships" xmlns:p="http://schemas.openxmlformats.org/presentationml/2006/main">
+  <p:cSld>
+    <p:spTree>
+      <p:nvGrpSpPr>
+        <p:cNvPr id="1" name=""/>
+        <p:cNvGrpSpPr/>
+        <p:nvPr/>
+      </p:nvGrpSpPr>
+      <p:grpSpPr>
+        <a:xfrm>
+          <a:off x="0" y="0"/>
+          <a:ext cx="0" cy="0"/>
+          <a:chOff x="0" y="0"/>
+          <a:chExt cx="0" cy="0"/>
+        </a:xfrm>
+      </p:grpSpPr>
+      <p:sp>
+        <p:nvSpPr>
+          <p:cNvPr id="2" name="Title 1"/>
+          <p:cNvSpPr>
+            <a:spLocks noGrp="1"/>
+          </p:cNvSpPr>
+          <p:nvPr>
+            <p:ph type="title"/>
+          </p:nvPr>
+        </p:nvSpPr>
+        <p:spPr/>
+        <p:txBody>
+          <a:bodyPr/>
+          <a:lstStyle/>
+          <a:p>
+            <a:endParaRPr lang="en-US" dirty="0"/>
+          </a:p>
+        </p:txBody>
+      </p:sp>
+      <p:sp>
+        <p:nvSpPr>
+          <p:cNvPr id="4" name="Text Placeholder 3"/>
+          <p:cNvSpPr>
+            <a:spLocks noGrp="1"/>
+          </p:cNvSpPr>
+          <p:nvPr>
+            <p:ph type="body" idx="1"/>
+          </p:nvPr>
+        </p:nvSpPr>
+        <p:spPr>
+          <a:xfrm>
+            <a:off x="1295401" y="5866355"/>
+            <a:ext cx="9590550" cy="523174"/>
+          </a:xfrm>
+        </p:spPr>
+        <p:txBody>
+          <a:bodyPr>
+            <a:normAutofit/>
+          </a:bodyPr>
+          <a:lstStyle/>
+          <a:p>
+            <a:r>
+              <a:rPr lang="en-US" dirty="0"/>
+              <a:t>https://xkcd.com/1597/</a:t>
+            </a:r>
+            <a:endParaRPr lang="en-US" dirty="0" smtClean="0"/>
+          </a:p>
+        </p:txBody>
+      </p:sp>
+      <p:pic>
+        <p:nvPicPr>
+          <p:cNvPr id="3074" name="Picture 2" descr="Git"/>
+          <p:cNvPicPr>
+            <a:picLocks noChangeAspect="1" noChangeArrowheads="1"/>
+          </p:cNvPicPr>
+          <p:nvPr/>
+        </p:nvPicPr>
+        <p:blipFill>
+          <a:blip r:embed="rId2">
+            <a:extLst>
+              <a:ext uri="{28A0092B-C50C-407E-A947-70E740481C1C}">
+                <a14:useLocalDpi xmlns:a14="http://schemas.microsoft.com/office/drawing/2010/main"/>
+              </a:ext>
+            </a:extLst>
+          </a:blip>
+          <a:srcRect/>
+          <a:stretch>
+            <a:fillRect/>
+          </a:stretch>
+        </p:blipFill>
+        <p:spPr bwMode="auto">
+          <a:xfrm>
+            <a:off x="3361889" y="339865"/>
+            <a:ext cx="5070011" cy="5526490"/>
+          </a:xfrm>
+          <a:prstGeom prst="rect">
+            <a:avLst/>
+          </a:prstGeom>
+          <a:noFill/>
+          <a:extLst>
+            <a:ext uri="{909E8E84-426E-40DD-AFC4-6F175D3DCCD1}">
+              <a14:hiddenFill xmlns:a14="http://schemas.microsoft.com/office/drawing/2010/main">
+                <a:solidFill>
+                  <a:srgbClr val="FFFFFF"/>
+                </a:solidFill>
+              </a14:hiddenFill>
+            </a:ext>
+          </a:extLst>
+        </p:spPr>
+      </p:pic>
+    </p:spTree>
+    <p:extLst>
+      <p:ext uri="{BB962C8B-B14F-4D97-AF65-F5344CB8AC3E}">
+        <p14:creationId xmlns:p14="http://schemas.microsoft.com/office/powerpoint/2010/main" val="1210915886"/>
+      </p:ext>
+    </p:extLst>
+  </p:cSld>
+  <p:clrMapOvr>
+    <a:masterClrMapping/>
+  </p:clrMapOvr>
+  <mc:AlternateContent xmlns:mc="http://schemas.openxmlformats.org/markup-compatibility/2006" xmlns:p14="http://schemas.microsoft.com/office/powerpoint/2010/main">
+    <mc:Choice Requires="p14">
+      <p:transition p14:dur="100">
+        <p:cut/>
+      </p:transition>
+    </mc:Choice>
+    <mc:Fallback xmlns="">
+      <p:transition>
+        <p:cut/>
+      </p:transition>
+    </mc:Fallback>
+  </mc:AlternateContent>
+  <p:timing>
+    <p:tnLst>
+      <p:par>
+        <p:cTn id="1" dur="indefinite" restart="never" nodeType="tmRoot"/>
+      </p:par>
+    </p:tnLst>
+  </p:timing>
+</p:sld>
+</file>
+
+<file path=ppt/slides/slide67.xml><?xml version="1.0" encoding="utf-8"?>
 <p:sld xmlns:a="http://schemas.openxmlformats.org/drawingml/2006/main" xmlns:r="http://schemas.openxmlformats.org/officeDocument/2006/relationships" xmlns:p="http://schemas.openxmlformats.org/presentationml/2006/main">
   <p:cSld>
     <p:spTree>
@@ -13604,47 +14515,49 @@
           <a:lstStyle/>
           <a:p>
             <a:r>
+              <a:rPr lang="en-US" dirty="0" smtClean="0"/>
+              <a:t>let's </a:t>
+            </a:r>
+            <a:r>
+              <a:rPr lang="en-US" dirty="0" smtClean="0"/>
+              <a:t>talk workflow</a:t>
+            </a:r>
+            <a:endParaRPr lang="en-US" dirty="0"/>
+          </a:p>
+        </p:txBody>
+      </p:sp>
+      <p:sp>
+        <p:nvSpPr>
+          <p:cNvPr id="4" name="Content Placeholder 3"/>
+          <p:cNvSpPr>
+            <a:spLocks noGrp="1"/>
+          </p:cNvSpPr>
+          <p:nvPr>
+            <p:ph type="body" idx="1"/>
+          </p:nvPr>
+        </p:nvSpPr>
+        <p:spPr/>
+        <p:txBody>
+          <a:bodyPr/>
+          <a:lstStyle/>
+          <a:p>
+            <a:r>
               <a:rPr lang="en-US" dirty="0"/>
-              <a:t>w</a:t>
-            </a:r>
-            <a:r>
-              <a:rPr lang="en-US" dirty="0" smtClean="0"/>
-              <a:t>hy use version control</a:t>
-            </a:r>
-            <a:endParaRPr lang="en-US" dirty="0"/>
-          </a:p>
-        </p:txBody>
-      </p:sp>
-      <p:sp>
-        <p:nvSpPr>
-          <p:cNvPr id="4" name="Content Placeholder 3"/>
-          <p:cNvSpPr>
-            <a:spLocks noGrp="1"/>
-          </p:cNvSpPr>
-          <p:nvPr>
-            <p:ph type="body" idx="1"/>
-          </p:nvPr>
-        </p:nvSpPr>
-        <p:spPr/>
-        <p:txBody>
-          <a:bodyPr/>
-          <a:lstStyle/>
-          <a:p>
-            <a:r>
-              <a:rPr lang="en-US" dirty="0"/>
-              <a:t>l</a:t>
-            </a:r>
-            <a:r>
-              <a:rPr lang="en-US" dirty="0" smtClean="0"/>
-              <a:t>et’s </a:t>
-            </a:r>
-            <a:r>
-              <a:rPr lang="en-US" dirty="0"/>
-              <a:t>talk </a:t>
-            </a:r>
-            <a:r>
-              <a:rPr lang="en-US" dirty="0" smtClean="0"/>
-              <a:t>workflow</a:t>
+              <a:t>i</a:t>
+            </a:r>
+            <a:r>
+              <a:rPr lang="en-US" dirty="0" smtClean="0"/>
+              <a:t>magine writing an essay</a:t>
+            </a:r>
+          </a:p>
+          <a:p>
+            <a:r>
+              <a:rPr lang="en-US" dirty="0" smtClean="0"/>
+              <a:t>what's </a:t>
+            </a:r>
+            <a:r>
+              <a:rPr lang="en-US" dirty="0" smtClean="0"/>
+              <a:t>the process like</a:t>
             </a:r>
             <a:endParaRPr lang="en-US" dirty="0"/>
           </a:p>
@@ -13653,7 +14566,7 @@
     </p:spTree>
     <p:extLst>
       <p:ext uri="{BB962C8B-B14F-4D97-AF65-F5344CB8AC3E}">
-        <p14:creationId xmlns:p14="http://schemas.microsoft.com/office/powerpoint/2010/main" val="3229551672"/>
+        <p14:creationId xmlns:p14="http://schemas.microsoft.com/office/powerpoint/2010/main" val="116247198"/>
       </p:ext>
     </p:extLst>
   </p:cSld>
@@ -13715,12 +14628,8 @@
           <a:lstStyle/>
           <a:p>
             <a:r>
-              <a:rPr lang="en-US" dirty="0"/>
-              <a:t>l</a:t>
-            </a:r>
-            <a:r>
-              <a:rPr lang="en-US" dirty="0" smtClean="0"/>
-              <a:t>et’s talk workflow</a:t>
+              <a:rPr lang="en-US" dirty="0" smtClean="0"/>
+              <a:t>the writing process</a:t>
             </a:r>
             <a:endParaRPr lang="en-US" dirty="0"/>
           </a:p>
@@ -13728,7 +14637,7 @@
       </p:sp>
       <p:sp>
         <p:nvSpPr>
-          <p:cNvPr id="4" name="Content Placeholder 3"/>
+          <p:cNvPr id="4" name="Text Placeholder 3"/>
           <p:cNvSpPr>
             <a:spLocks noGrp="1"/>
           </p:cNvSpPr>
@@ -13741,24 +14650,6 @@
           <a:bodyPr/>
           <a:lstStyle/>
           <a:p>
-            <a:r>
-              <a:rPr lang="en-US" dirty="0"/>
-              <a:t>i</a:t>
-            </a:r>
-            <a:r>
-              <a:rPr lang="en-US" dirty="0" smtClean="0"/>
-              <a:t>magine writing an essay</a:t>
-            </a:r>
-          </a:p>
-          <a:p>
-            <a:r>
-              <a:rPr lang="en-US" dirty="0"/>
-              <a:t>w</a:t>
-            </a:r>
-            <a:r>
-              <a:rPr lang="en-US" dirty="0" smtClean="0"/>
-              <a:t>hat’s the process like</a:t>
-            </a:r>
             <a:endParaRPr lang="en-US" dirty="0"/>
           </a:p>
         </p:txBody>
@@ -13766,7 +14657,7 @@
     </p:spTree>
     <p:extLst>
       <p:ext uri="{BB962C8B-B14F-4D97-AF65-F5344CB8AC3E}">
-        <p14:creationId xmlns:p14="http://schemas.microsoft.com/office/powerpoint/2010/main" val="2856505888"/>
+        <p14:creationId xmlns:p14="http://schemas.microsoft.com/office/powerpoint/2010/main" val="84033053"/>
       </p:ext>
     </p:extLst>
   </p:cSld>
@@ -13850,6 +14741,10 @@
           <a:bodyPr/>
           <a:lstStyle/>
           <a:p>
+            <a:r>
+              <a:rPr lang="en-US" dirty="0" smtClean="0"/>
+              <a:t>write the whole thing at once</a:t>
+            </a:r>
             <a:endParaRPr lang="en-US" dirty="0"/>
           </a:p>
         </p:txBody>
@@ -13857,7 +14752,7 @@
     </p:spTree>
     <p:extLst>
       <p:ext uri="{BB962C8B-B14F-4D97-AF65-F5344CB8AC3E}">
-        <p14:creationId xmlns:p14="http://schemas.microsoft.com/office/powerpoint/2010/main" val="84033053"/>
+        <p14:creationId xmlns:p14="http://schemas.microsoft.com/office/powerpoint/2010/main" val="1980292581"/>
       </p:ext>
     </p:extLst>
   </p:cSld>

</xml_diff>